<commit_message>
Made few edits and added the new pictures.
</commit_message>
<xml_diff>
--- a/Shiva Dissertation/chap3/pictures/pdf/Angle.pptx
+++ b/Shiva Dissertation/chap3/pictures/pdf/Angle.pptx
@@ -243,7 +243,7 @@
           <a:p>
             <a:fld id="{9578BA41-4624-3049-9962-89A9624110BB}" type="datetimeFigureOut">
               <a:rPr lang="en-US" smtClean="0"/>
-              <a:t>6/11/18</a:t>
+              <a:t>6/12/18</a:t>
             </a:fld>
             <a:endParaRPr lang="en-US"/>
           </a:p>
@@ -413,7 +413,7 @@
           <a:p>
             <a:fld id="{9578BA41-4624-3049-9962-89A9624110BB}" type="datetimeFigureOut">
               <a:rPr lang="en-US" smtClean="0"/>
-              <a:t>6/11/18</a:t>
+              <a:t>6/12/18</a:t>
             </a:fld>
             <a:endParaRPr lang="en-US"/>
           </a:p>
@@ -593,7 +593,7 @@
           <a:p>
             <a:fld id="{9578BA41-4624-3049-9962-89A9624110BB}" type="datetimeFigureOut">
               <a:rPr lang="en-US" smtClean="0"/>
-              <a:t>6/11/18</a:t>
+              <a:t>6/12/18</a:t>
             </a:fld>
             <a:endParaRPr lang="en-US"/>
           </a:p>
@@ -763,7 +763,7 @@
           <a:p>
             <a:fld id="{9578BA41-4624-3049-9962-89A9624110BB}" type="datetimeFigureOut">
               <a:rPr lang="en-US" smtClean="0"/>
-              <a:t>6/11/18</a:t>
+              <a:t>6/12/18</a:t>
             </a:fld>
             <a:endParaRPr lang="en-US"/>
           </a:p>
@@ -1009,7 +1009,7 @@
           <a:p>
             <a:fld id="{9578BA41-4624-3049-9962-89A9624110BB}" type="datetimeFigureOut">
               <a:rPr lang="en-US" smtClean="0"/>
-              <a:t>6/11/18</a:t>
+              <a:t>6/12/18</a:t>
             </a:fld>
             <a:endParaRPr lang="en-US"/>
           </a:p>
@@ -1241,7 +1241,7 @@
           <a:p>
             <a:fld id="{9578BA41-4624-3049-9962-89A9624110BB}" type="datetimeFigureOut">
               <a:rPr lang="en-US" smtClean="0"/>
-              <a:t>6/11/18</a:t>
+              <a:t>6/12/18</a:t>
             </a:fld>
             <a:endParaRPr lang="en-US"/>
           </a:p>
@@ -1608,7 +1608,7 @@
           <a:p>
             <a:fld id="{9578BA41-4624-3049-9962-89A9624110BB}" type="datetimeFigureOut">
               <a:rPr lang="en-US" smtClean="0"/>
-              <a:t>6/11/18</a:t>
+              <a:t>6/12/18</a:t>
             </a:fld>
             <a:endParaRPr lang="en-US"/>
           </a:p>
@@ -1726,7 +1726,7 @@
           <a:p>
             <a:fld id="{9578BA41-4624-3049-9962-89A9624110BB}" type="datetimeFigureOut">
               <a:rPr lang="en-US" smtClean="0"/>
-              <a:t>6/11/18</a:t>
+              <a:t>6/12/18</a:t>
             </a:fld>
             <a:endParaRPr lang="en-US"/>
           </a:p>
@@ -1821,7 +1821,7 @@
           <a:p>
             <a:fld id="{9578BA41-4624-3049-9962-89A9624110BB}" type="datetimeFigureOut">
               <a:rPr lang="en-US" smtClean="0"/>
-              <a:t>6/11/18</a:t>
+              <a:t>6/12/18</a:t>
             </a:fld>
             <a:endParaRPr lang="en-US"/>
           </a:p>
@@ -2098,7 +2098,7 @@
           <a:p>
             <a:fld id="{9578BA41-4624-3049-9962-89A9624110BB}" type="datetimeFigureOut">
               <a:rPr lang="en-US" smtClean="0"/>
-              <a:t>6/11/18</a:t>
+              <a:t>6/12/18</a:t>
             </a:fld>
             <a:endParaRPr lang="en-US"/>
           </a:p>
@@ -2355,7 +2355,7 @@
           <a:p>
             <a:fld id="{9578BA41-4624-3049-9962-89A9624110BB}" type="datetimeFigureOut">
               <a:rPr lang="en-US" smtClean="0"/>
-              <a:t>6/11/18</a:t>
+              <a:t>6/12/18</a:t>
             </a:fld>
             <a:endParaRPr lang="en-US"/>
           </a:p>
@@ -2568,7 +2568,7 @@
           <a:p>
             <a:fld id="{9578BA41-4624-3049-9962-89A9624110BB}" type="datetimeFigureOut">
               <a:rPr lang="en-US" smtClean="0"/>
-              <a:t>6/11/18</a:t>
+              <a:t>6/12/18</a:t>
             </a:fld>
             <a:endParaRPr lang="en-US"/>
           </a:p>
@@ -2975,10 +2975,10 @@
       </p:grpSpPr>
       <p:pic>
         <p:nvPicPr>
-          <p:cNvPr id="6" name="Picture 5">
+          <p:cNvPr id="7" name="Picture 6">
             <a:extLst>
               <a:ext uri="{FF2B5EF4-FFF2-40B4-BE49-F238E27FC236}">
-                <a16:creationId xmlns:a16="http://schemas.microsoft.com/office/drawing/2014/main" id="{D3E8C632-0BDB-A846-B145-594C83E2C43C}"/>
+                <a16:creationId xmlns:a16="http://schemas.microsoft.com/office/drawing/2014/main" id="{C00CBB48-959B-5B48-A012-CC896F72E201}"/>
               </a:ext>
             </a:extLst>
           </p:cNvPr>
@@ -2989,13 +2989,13 @@
         </p:nvPicPr>
         <p:blipFill rotWithShape="1">
           <a:blip r:embed="rId2"/>
-          <a:srcRect l="53071" t="52227" r="30300" b="31379"/>
+          <a:srcRect l="53328" t="34040" r="29823" b="50007"/>
           <a:stretch/>
         </p:blipFill>
         <p:spPr>
           <a:xfrm>
-            <a:off x="-114755" y="721534"/>
-            <a:ext cx="1488261" cy="925138"/>
+            <a:off x="1084946" y="962441"/>
+            <a:ext cx="1501488" cy="888584"/>
           </a:xfrm>
           <a:prstGeom prst="rect">
             <a:avLst/>
@@ -3004,10 +3004,10 @@
       </p:pic>
       <p:pic>
         <p:nvPicPr>
-          <p:cNvPr id="8" name="Picture 7">
+          <p:cNvPr id="4" name="Picture 3">
             <a:extLst>
               <a:ext uri="{FF2B5EF4-FFF2-40B4-BE49-F238E27FC236}">
-                <a16:creationId xmlns:a16="http://schemas.microsoft.com/office/drawing/2014/main" id="{5ED371A8-6FCB-704C-8570-2DDCB88A8FE9}"/>
+                <a16:creationId xmlns:a16="http://schemas.microsoft.com/office/drawing/2014/main" id="{7ADB9CE2-F896-A844-8723-E2BCC5DD29C0}"/>
               </a:ext>
             </a:extLst>
           </p:cNvPr>
@@ -3018,13 +3018,13 @@
         </p:nvPicPr>
         <p:blipFill rotWithShape="1">
           <a:blip r:embed="rId2"/>
-          <a:srcRect l="54195" t="34627" r="31423" b="46542"/>
+          <a:srcRect l="53289" t="53094" r="32168" b="33967"/>
           <a:stretch/>
         </p:blipFill>
         <p:spPr>
           <a:xfrm>
-            <a:off x="1163493" y="584024"/>
-            <a:ext cx="1287142" cy="1062648"/>
+            <a:off x="-135627" y="1140639"/>
+            <a:ext cx="1317577" cy="732611"/>
           </a:xfrm>
           <a:prstGeom prst="rect">
             <a:avLst/>
@@ -3033,10 +3033,10 @@
       </p:pic>
       <p:pic>
         <p:nvPicPr>
-          <p:cNvPr id="10" name="Picture 9">
+          <p:cNvPr id="12" name="Picture 11">
             <a:extLst>
               <a:ext uri="{FF2B5EF4-FFF2-40B4-BE49-F238E27FC236}">
-                <a16:creationId xmlns:a16="http://schemas.microsoft.com/office/drawing/2014/main" id="{1C89A597-0D6C-A54E-9044-9BFAAFA9AD4A}"/>
+                <a16:creationId xmlns:a16="http://schemas.microsoft.com/office/drawing/2014/main" id="{048054AE-AF09-7749-B4F9-69E4BA20FB8C}"/>
               </a:ext>
             </a:extLst>
           </p:cNvPr>
@@ -3047,19 +3047,180 @@
         </p:nvPicPr>
         <p:blipFill rotWithShape="1">
           <a:blip r:embed="rId2"/>
-          <a:srcRect l="53970" t="9817" r="30075" b="65334"/>
+          <a:srcRect l="53867" t="10417" r="31759" b="65558"/>
           <a:stretch/>
         </p:blipFill>
         <p:spPr>
           <a:xfrm>
-            <a:off x="2363130" y="69635"/>
-            <a:ext cx="1427926" cy="1402312"/>
+            <a:off x="2366863" y="493346"/>
+            <a:ext cx="1279604" cy="1336693"/>
           </a:xfrm>
           <a:prstGeom prst="rect">
             <a:avLst/>
           </a:prstGeom>
         </p:spPr>
       </p:pic>
+      <p:cxnSp>
+        <p:nvCxnSpPr>
+          <p:cNvPr id="14" name="Straight Connector 13">
+            <a:extLst>
+              <a:ext uri="{FF2B5EF4-FFF2-40B4-BE49-F238E27FC236}">
+                <a16:creationId xmlns:a16="http://schemas.microsoft.com/office/drawing/2014/main" id="{E44580E1-36CA-0443-B79C-70F9DCBAF340}"/>
+              </a:ext>
+            </a:extLst>
+          </p:cNvPr>
+          <p:cNvCxnSpPr>
+            <a:cxnSpLocks/>
+          </p:cNvCxnSpPr>
+          <p:nvPr/>
+        </p:nvCxnSpPr>
+        <p:spPr>
+          <a:xfrm flipH="1" flipV="1">
+            <a:off x="957581" y="1154874"/>
+            <a:ext cx="182757" cy="106831"/>
+          </a:xfrm>
+          <a:prstGeom prst="line">
+            <a:avLst/>
+          </a:prstGeom>
+          <a:ln w="31750"/>
+        </p:spPr>
+        <p:style>
+          <a:lnRef idx="1">
+            <a:schemeClr val="dk1"/>
+          </a:lnRef>
+          <a:fillRef idx="0">
+            <a:schemeClr val="dk1"/>
+          </a:fillRef>
+          <a:effectRef idx="0">
+            <a:schemeClr val="dk1"/>
+          </a:effectRef>
+          <a:fontRef idx="minor">
+            <a:schemeClr val="tx1"/>
+          </a:fontRef>
+        </p:style>
+      </p:cxnSp>
+      <p:cxnSp>
+        <p:nvCxnSpPr>
+          <p:cNvPr id="16" name="Straight Connector 15">
+            <a:extLst>
+              <a:ext uri="{FF2B5EF4-FFF2-40B4-BE49-F238E27FC236}">
+                <a16:creationId xmlns:a16="http://schemas.microsoft.com/office/drawing/2014/main" id="{5910CABE-5AB5-2E43-9ECB-A52B801F8994}"/>
+              </a:ext>
+            </a:extLst>
+          </p:cNvPr>
+          <p:cNvCxnSpPr>
+            <a:cxnSpLocks/>
+          </p:cNvCxnSpPr>
+          <p:nvPr/>
+        </p:nvCxnSpPr>
+        <p:spPr>
+          <a:xfrm flipH="1" flipV="1">
+            <a:off x="934426" y="1261705"/>
+            <a:ext cx="203074" cy="1"/>
+          </a:xfrm>
+          <a:prstGeom prst="line">
+            <a:avLst/>
+          </a:prstGeom>
+          <a:ln w="31750"/>
+        </p:spPr>
+        <p:style>
+          <a:lnRef idx="1">
+            <a:schemeClr val="dk1"/>
+          </a:lnRef>
+          <a:fillRef idx="0">
+            <a:schemeClr val="dk1"/>
+          </a:fillRef>
+          <a:effectRef idx="0">
+            <a:schemeClr val="dk1"/>
+          </a:effectRef>
+          <a:fontRef idx="minor">
+            <a:schemeClr val="tx1"/>
+          </a:fontRef>
+        </p:style>
+      </p:cxnSp>
+      <p:sp>
+        <p:nvSpPr>
+          <p:cNvPr id="19" name="Arc 18">
+            <a:extLst>
+              <a:ext uri="{FF2B5EF4-FFF2-40B4-BE49-F238E27FC236}">
+                <a16:creationId xmlns:a16="http://schemas.microsoft.com/office/drawing/2014/main" id="{B15C8412-18C0-C144-88F6-943EA08ED414}"/>
+              </a:ext>
+            </a:extLst>
+          </p:cNvPr>
+          <p:cNvSpPr/>
+          <p:nvPr/>
+        </p:nvSpPr>
+        <p:spPr>
+          <a:xfrm rot="19556421">
+            <a:off x="979291" y="1156578"/>
+            <a:ext cx="307510" cy="300915"/>
+          </a:xfrm>
+          <a:prstGeom prst="arc">
+            <a:avLst>
+              <a:gd name="adj1" fmla="val 13898215"/>
+              <a:gd name="adj2" fmla="val 15472972"/>
+            </a:avLst>
+          </a:prstGeom>
+          <a:ln w="25400"/>
+        </p:spPr>
+        <p:style>
+          <a:lnRef idx="1">
+            <a:schemeClr val="dk1"/>
+          </a:lnRef>
+          <a:fillRef idx="0">
+            <a:schemeClr val="dk1"/>
+          </a:fillRef>
+          <a:effectRef idx="0">
+            <a:schemeClr val="dk1"/>
+          </a:effectRef>
+          <a:fontRef idx="minor">
+            <a:schemeClr val="tx1"/>
+          </a:fontRef>
+        </p:style>
+        <p:txBody>
+          <a:bodyPr rtlCol="0" anchor="ctr"/>
+          <a:lstStyle/>
+          <a:p>
+            <a:pPr algn="ctr"/>
+            <a:endParaRPr lang="en-US"/>
+          </a:p>
+        </p:txBody>
+      </p:sp>
+      <p:sp>
+        <p:nvSpPr>
+          <p:cNvPr id="21" name="TextBox 20">
+            <a:extLst>
+              <a:ext uri="{FF2B5EF4-FFF2-40B4-BE49-F238E27FC236}">
+                <a16:creationId xmlns:a16="http://schemas.microsoft.com/office/drawing/2014/main" id="{454D0965-38D0-1344-AD3A-F3B87BDA227B}"/>
+              </a:ext>
+            </a:extLst>
+          </p:cNvPr>
+          <p:cNvSpPr txBox="1"/>
+          <p:nvPr/>
+        </p:nvSpPr>
+        <p:spPr>
+          <a:xfrm>
+            <a:off x="777624" y="1081555"/>
+            <a:ext cx="220005" cy="246221"/>
+          </a:xfrm>
+          <a:prstGeom prst="rect">
+            <a:avLst/>
+          </a:prstGeom>
+          <a:noFill/>
+        </p:spPr>
+        <p:txBody>
+          <a:bodyPr wrap="square" rtlCol="0">
+            <a:spAutoFit/>
+          </a:bodyPr>
+          <a:lstStyle/>
+          <a:p>
+            <a:r>
+              <a:rPr lang="en-US" sz="1000" i="1" dirty="0"/>
+              <a:t>⍺</a:t>
+            </a:r>
+          </a:p>
+        </p:txBody>
+      </p:sp>
       <p:cxnSp>
         <p:nvCxnSpPr>
           <p:cNvPr id="3" name="Straight Connector 2">
@@ -3074,7 +3235,7 @@
         </p:nvCxnSpPr>
         <p:spPr>
           <a:xfrm flipH="1" flipV="1">
-            <a:off x="2143125" y="719512"/>
+            <a:off x="2143125" y="1119306"/>
             <a:ext cx="196850" cy="191713"/>
           </a:xfrm>
           <a:prstGeom prst="line">
@@ -3113,7 +3274,7 @@
         </p:nvCxnSpPr>
         <p:spPr>
           <a:xfrm flipH="1" flipV="1">
-            <a:off x="2051914" y="904548"/>
+            <a:off x="2051914" y="1304342"/>
             <a:ext cx="275882" cy="1"/>
           </a:xfrm>
           <a:prstGeom prst="line">
@@ -3136,84 +3297,6 @@
           </a:fontRef>
         </p:style>
       </p:cxnSp>
-      <p:cxnSp>
-        <p:nvCxnSpPr>
-          <p:cNvPr id="14" name="Straight Connector 13">
-            <a:extLst>
-              <a:ext uri="{FF2B5EF4-FFF2-40B4-BE49-F238E27FC236}">
-                <a16:creationId xmlns:a16="http://schemas.microsoft.com/office/drawing/2014/main" id="{E44580E1-36CA-0443-B79C-70F9DCBAF340}"/>
-              </a:ext>
-            </a:extLst>
-          </p:cNvPr>
-          <p:cNvCxnSpPr>
-            <a:cxnSpLocks/>
-          </p:cNvCxnSpPr>
-          <p:nvPr/>
-        </p:nvCxnSpPr>
-        <p:spPr>
-          <a:xfrm flipH="1" flipV="1">
-            <a:off x="987552" y="778107"/>
-            <a:ext cx="180932" cy="110489"/>
-          </a:xfrm>
-          <a:prstGeom prst="line">
-            <a:avLst/>
-          </a:prstGeom>
-          <a:ln w="31750"/>
-        </p:spPr>
-        <p:style>
-          <a:lnRef idx="1">
-            <a:schemeClr val="dk1"/>
-          </a:lnRef>
-          <a:fillRef idx="0">
-            <a:schemeClr val="dk1"/>
-          </a:fillRef>
-          <a:effectRef idx="0">
-            <a:schemeClr val="dk1"/>
-          </a:effectRef>
-          <a:fontRef idx="minor">
-            <a:schemeClr val="tx1"/>
-          </a:fontRef>
-        </p:style>
-      </p:cxnSp>
-      <p:cxnSp>
-        <p:nvCxnSpPr>
-          <p:cNvPr id="16" name="Straight Connector 15">
-            <a:extLst>
-              <a:ext uri="{FF2B5EF4-FFF2-40B4-BE49-F238E27FC236}">
-                <a16:creationId xmlns:a16="http://schemas.microsoft.com/office/drawing/2014/main" id="{5910CABE-5AB5-2E43-9ECB-A52B801F8994}"/>
-              </a:ext>
-            </a:extLst>
-          </p:cNvPr>
-          <p:cNvCxnSpPr>
-            <a:cxnSpLocks/>
-          </p:cNvCxnSpPr>
-          <p:nvPr/>
-        </p:nvCxnSpPr>
-        <p:spPr>
-          <a:xfrm flipH="1" flipV="1">
-            <a:off x="964397" y="884939"/>
-            <a:ext cx="203074" cy="1"/>
-          </a:xfrm>
-          <a:prstGeom prst="line">
-            <a:avLst/>
-          </a:prstGeom>
-          <a:ln w="31750"/>
-        </p:spPr>
-        <p:style>
-          <a:lnRef idx="1">
-            <a:schemeClr val="dk1"/>
-          </a:lnRef>
-          <a:fillRef idx="0">
-            <a:schemeClr val="dk1"/>
-          </a:fillRef>
-          <a:effectRef idx="0">
-            <a:schemeClr val="dk1"/>
-          </a:effectRef>
-          <a:fontRef idx="minor">
-            <a:schemeClr val="tx1"/>
-          </a:fontRef>
-        </p:style>
-      </p:cxnSp>
       <p:sp>
         <p:nvSpPr>
           <p:cNvPr id="18" name="Arc 17">
@@ -3228,7 +3311,7 @@
         </p:nvSpPr>
         <p:spPr>
           <a:xfrm rot="19556421">
-            <a:off x="2124372" y="744833"/>
+            <a:off x="2124372" y="1144627"/>
             <a:ext cx="307510" cy="300915"/>
           </a:xfrm>
           <a:prstGeom prst="arc">
@@ -3264,54 +3347,6 @@
       </p:sp>
       <p:sp>
         <p:nvSpPr>
-          <p:cNvPr id="19" name="Arc 18">
-            <a:extLst>
-              <a:ext uri="{FF2B5EF4-FFF2-40B4-BE49-F238E27FC236}">
-                <a16:creationId xmlns:a16="http://schemas.microsoft.com/office/drawing/2014/main" id="{B15C8412-18C0-C144-88F6-943EA08ED414}"/>
-              </a:ext>
-            </a:extLst>
-          </p:cNvPr>
-          <p:cNvSpPr/>
-          <p:nvPr/>
-        </p:nvSpPr>
-        <p:spPr>
-          <a:xfrm rot="19556421">
-            <a:off x="1009262" y="779812"/>
-            <a:ext cx="307510" cy="300915"/>
-          </a:xfrm>
-          <a:prstGeom prst="arc">
-            <a:avLst>
-              <a:gd name="adj1" fmla="val 13898215"/>
-              <a:gd name="adj2" fmla="val 15472972"/>
-            </a:avLst>
-          </a:prstGeom>
-          <a:ln w="25400"/>
-        </p:spPr>
-        <p:style>
-          <a:lnRef idx="1">
-            <a:schemeClr val="dk1"/>
-          </a:lnRef>
-          <a:fillRef idx="0">
-            <a:schemeClr val="dk1"/>
-          </a:fillRef>
-          <a:effectRef idx="0">
-            <a:schemeClr val="dk1"/>
-          </a:effectRef>
-          <a:fontRef idx="minor">
-            <a:schemeClr val="tx1"/>
-          </a:fontRef>
-        </p:style>
-        <p:txBody>
-          <a:bodyPr rtlCol="0" anchor="ctr"/>
-          <a:lstStyle/>
-          <a:p>
-            <a:pPr algn="ctr"/>
-            <a:endParaRPr lang="en-US"/>
-          </a:p>
-        </p:txBody>
-      </p:sp>
-      <p:sp>
-        <p:nvSpPr>
           <p:cNvPr id="20" name="TextBox 19">
             <a:extLst>
               <a:ext uri="{FF2B5EF4-FFF2-40B4-BE49-F238E27FC236}">
@@ -3324,8 +3359,8 @@
         </p:nvSpPr>
         <p:spPr>
           <a:xfrm>
-            <a:off x="1835852" y="570736"/>
-            <a:ext cx="220005" cy="400110"/>
+            <a:off x="1920579" y="1055843"/>
+            <a:ext cx="220005" cy="246221"/>
           </a:xfrm>
           <a:prstGeom prst="rect">
             <a:avLst/>
@@ -3339,42 +3374,7 @@
           <a:lstStyle/>
           <a:p>
             <a:r>
-              <a:rPr lang="en-US" sz="2000" i="1" dirty="0"/>
-              <a:t>⍺</a:t>
-            </a:r>
-          </a:p>
-        </p:txBody>
-      </p:sp>
-      <p:sp>
-        <p:nvSpPr>
-          <p:cNvPr id="21" name="TextBox 20">
-            <a:extLst>
-              <a:ext uri="{FF2B5EF4-FFF2-40B4-BE49-F238E27FC236}">
-                <a16:creationId xmlns:a16="http://schemas.microsoft.com/office/drawing/2014/main" id="{454D0965-38D0-1344-AD3A-F3B87BDA227B}"/>
-              </a:ext>
-            </a:extLst>
-          </p:cNvPr>
-          <p:cNvSpPr txBox="1"/>
-          <p:nvPr/>
-        </p:nvSpPr>
-        <p:spPr>
-          <a:xfrm>
-            <a:off x="687734" y="568660"/>
-            <a:ext cx="220005" cy="400110"/>
-          </a:xfrm>
-          <a:prstGeom prst="rect">
-            <a:avLst/>
-          </a:prstGeom>
-          <a:noFill/>
-        </p:spPr>
-        <p:txBody>
-          <a:bodyPr wrap="square" rtlCol="0">
-            <a:spAutoFit/>
-          </a:bodyPr>
-          <a:lstStyle/>
-          <a:p>
-            <a:r>
-              <a:rPr lang="en-US" sz="2000" i="1" dirty="0"/>
+              <a:rPr lang="en-US" sz="1000" i="1" dirty="0"/>
               <a:t>⍺</a:t>
             </a:r>
           </a:p>
@@ -3389,13 +3389,15 @@
               </a:ext>
             </a:extLst>
           </p:cNvPr>
-          <p:cNvCxnSpPr/>
+          <p:cNvCxnSpPr>
+            <a:cxnSpLocks/>
+          </p:cNvCxnSpPr>
           <p:nvPr/>
         </p:nvCxnSpPr>
         <p:spPr>
-          <a:xfrm flipH="1" flipV="1">
-            <a:off x="2895686" y="992390"/>
-            <a:ext cx="196850" cy="191713"/>
+          <a:xfrm flipV="1">
+            <a:off x="2992930" y="1430307"/>
+            <a:ext cx="263007" cy="104026"/>
           </a:xfrm>
           <a:prstGeom prst="line">
             <a:avLst/>
@@ -4573,6 +4575,3153 @@
           </p:style>
         </p:cxnSp>
       </p:grpSp>
+      <p:grpSp>
+        <p:nvGrpSpPr>
+          <p:cNvPr id="61" name="Group 60">
+            <a:extLst>
+              <a:ext uri="{FF2B5EF4-FFF2-40B4-BE49-F238E27FC236}">
+                <a16:creationId xmlns:a16="http://schemas.microsoft.com/office/drawing/2014/main" id="{964735C7-1ADF-E448-9CCF-6A46C0E1D646}"/>
+              </a:ext>
+            </a:extLst>
+          </p:cNvPr>
+          <p:cNvGrpSpPr/>
+          <p:nvPr/>
+        </p:nvGrpSpPr>
+        <p:grpSpPr>
+          <a:xfrm>
+            <a:off x="1422696" y="218998"/>
+            <a:ext cx="56056" cy="162129"/>
+            <a:chOff x="207264" y="250046"/>
+            <a:chExt cx="56056" cy="162129"/>
+          </a:xfrm>
+        </p:grpSpPr>
+        <p:sp>
+          <p:nvSpPr>
+            <p:cNvPr id="62" name="Oval 61">
+              <a:extLst>
+                <a:ext uri="{FF2B5EF4-FFF2-40B4-BE49-F238E27FC236}">
+                  <a16:creationId xmlns:a16="http://schemas.microsoft.com/office/drawing/2014/main" id="{0115C1E2-4F3D-5842-B04E-97A4529EC23E}"/>
+                </a:ext>
+              </a:extLst>
+            </p:cNvPr>
+            <p:cNvSpPr/>
+            <p:nvPr/>
+          </p:nvSpPr>
+          <p:spPr>
+            <a:xfrm>
+              <a:off x="207264" y="356119"/>
+              <a:ext cx="56056" cy="56056"/>
+            </a:xfrm>
+            <a:prstGeom prst="ellipse">
+              <a:avLst/>
+            </a:prstGeom>
+            <a:solidFill>
+              <a:srgbClr val="82A02E"/>
+            </a:solidFill>
+            <a:ln>
+              <a:noFill/>
+            </a:ln>
+          </p:spPr>
+          <p:style>
+            <a:lnRef idx="2">
+              <a:schemeClr val="accent1">
+                <a:shade val="50000"/>
+              </a:schemeClr>
+            </a:lnRef>
+            <a:fillRef idx="1">
+              <a:schemeClr val="accent1"/>
+            </a:fillRef>
+            <a:effectRef idx="0">
+              <a:schemeClr val="accent1"/>
+            </a:effectRef>
+            <a:fontRef idx="minor">
+              <a:schemeClr val="lt1"/>
+            </a:fontRef>
+          </p:style>
+          <p:txBody>
+            <a:bodyPr rtlCol="0" anchor="ctr"/>
+            <a:lstStyle/>
+            <a:p>
+              <a:pPr algn="ctr"/>
+              <a:endParaRPr lang="en-US"/>
+            </a:p>
+          </p:txBody>
+        </p:sp>
+        <p:cxnSp>
+          <p:nvCxnSpPr>
+            <p:cNvPr id="63" name="Straight Connector 62">
+              <a:extLst>
+                <a:ext uri="{FF2B5EF4-FFF2-40B4-BE49-F238E27FC236}">
+                  <a16:creationId xmlns:a16="http://schemas.microsoft.com/office/drawing/2014/main" id="{FA247074-2DF3-4149-BB1D-40694A877FD6}"/>
+                </a:ext>
+              </a:extLst>
+            </p:cNvPr>
+            <p:cNvCxnSpPr>
+              <a:cxnSpLocks/>
+            </p:cNvCxnSpPr>
+            <p:nvPr/>
+          </p:nvCxnSpPr>
+          <p:spPr>
+            <a:xfrm flipH="1" flipV="1">
+              <a:off x="212141" y="255753"/>
+              <a:ext cx="3332" cy="86350"/>
+            </a:xfrm>
+            <a:prstGeom prst="line">
+              <a:avLst/>
+            </a:prstGeom>
+          </p:spPr>
+          <p:style>
+            <a:lnRef idx="1">
+              <a:schemeClr val="accent1"/>
+            </a:lnRef>
+            <a:fillRef idx="0">
+              <a:schemeClr val="accent1"/>
+            </a:fillRef>
+            <a:effectRef idx="0">
+              <a:schemeClr val="accent1"/>
+            </a:effectRef>
+            <a:fontRef idx="minor">
+              <a:schemeClr val="tx1"/>
+            </a:fontRef>
+          </p:style>
+        </p:cxnSp>
+        <p:cxnSp>
+          <p:nvCxnSpPr>
+            <p:cNvPr id="64" name="Straight Connector 63">
+              <a:extLst>
+                <a:ext uri="{FF2B5EF4-FFF2-40B4-BE49-F238E27FC236}">
+                  <a16:creationId xmlns:a16="http://schemas.microsoft.com/office/drawing/2014/main" id="{45675426-4744-C24A-BD30-ACD4F505C8EE}"/>
+                </a:ext>
+              </a:extLst>
+            </p:cNvPr>
+            <p:cNvCxnSpPr/>
+            <p:nvPr/>
+          </p:nvCxnSpPr>
+          <p:spPr>
+            <a:xfrm flipH="1" flipV="1">
+              <a:off x="231960" y="250046"/>
+              <a:ext cx="3332" cy="86350"/>
+            </a:xfrm>
+            <a:prstGeom prst="line">
+              <a:avLst/>
+            </a:prstGeom>
+          </p:spPr>
+          <p:style>
+            <a:lnRef idx="1">
+              <a:schemeClr val="accent1"/>
+            </a:lnRef>
+            <a:fillRef idx="0">
+              <a:schemeClr val="accent1"/>
+            </a:fillRef>
+            <a:effectRef idx="0">
+              <a:schemeClr val="accent1"/>
+            </a:effectRef>
+            <a:fontRef idx="minor">
+              <a:schemeClr val="tx1"/>
+            </a:fontRef>
+          </p:style>
+        </p:cxnSp>
+        <p:cxnSp>
+          <p:nvCxnSpPr>
+            <p:cNvPr id="65" name="Straight Connector 64">
+              <a:extLst>
+                <a:ext uri="{FF2B5EF4-FFF2-40B4-BE49-F238E27FC236}">
+                  <a16:creationId xmlns:a16="http://schemas.microsoft.com/office/drawing/2014/main" id="{08BA1C17-A51D-DD43-BFD5-1C88FEE84294}"/>
+                </a:ext>
+              </a:extLst>
+            </p:cNvPr>
+            <p:cNvCxnSpPr>
+              <a:cxnSpLocks/>
+            </p:cNvCxnSpPr>
+            <p:nvPr/>
+          </p:nvCxnSpPr>
+          <p:spPr>
+            <a:xfrm flipH="1" flipV="1">
+              <a:off x="250241" y="255753"/>
+              <a:ext cx="3332" cy="86350"/>
+            </a:xfrm>
+            <a:prstGeom prst="line">
+              <a:avLst/>
+            </a:prstGeom>
+          </p:spPr>
+          <p:style>
+            <a:lnRef idx="1">
+              <a:schemeClr val="accent1"/>
+            </a:lnRef>
+            <a:fillRef idx="0">
+              <a:schemeClr val="accent1"/>
+            </a:fillRef>
+            <a:effectRef idx="0">
+              <a:schemeClr val="accent1"/>
+            </a:effectRef>
+            <a:fontRef idx="minor">
+              <a:schemeClr val="tx1"/>
+            </a:fontRef>
+          </p:style>
+        </p:cxnSp>
+      </p:grpSp>
+      <p:grpSp>
+        <p:nvGrpSpPr>
+          <p:cNvPr id="69" name="Group 68">
+            <a:extLst>
+              <a:ext uri="{FF2B5EF4-FFF2-40B4-BE49-F238E27FC236}">
+                <a16:creationId xmlns:a16="http://schemas.microsoft.com/office/drawing/2014/main" id="{718669E4-4844-F449-AD8E-CD2CC44D632D}"/>
+              </a:ext>
+            </a:extLst>
+          </p:cNvPr>
+          <p:cNvGrpSpPr/>
+          <p:nvPr/>
+        </p:nvGrpSpPr>
+        <p:grpSpPr>
+          <a:xfrm>
+            <a:off x="1575096" y="371398"/>
+            <a:ext cx="56056" cy="162129"/>
+            <a:chOff x="207264" y="250046"/>
+            <a:chExt cx="56056" cy="162129"/>
+          </a:xfrm>
+        </p:grpSpPr>
+        <p:sp>
+          <p:nvSpPr>
+            <p:cNvPr id="70" name="Oval 69">
+              <a:extLst>
+                <a:ext uri="{FF2B5EF4-FFF2-40B4-BE49-F238E27FC236}">
+                  <a16:creationId xmlns:a16="http://schemas.microsoft.com/office/drawing/2014/main" id="{2E5CA649-6DAD-0242-8B32-5D48ACF0068A}"/>
+                </a:ext>
+              </a:extLst>
+            </p:cNvPr>
+            <p:cNvSpPr/>
+            <p:nvPr/>
+          </p:nvSpPr>
+          <p:spPr>
+            <a:xfrm>
+              <a:off x="207264" y="356119"/>
+              <a:ext cx="56056" cy="56056"/>
+            </a:xfrm>
+            <a:prstGeom prst="ellipse">
+              <a:avLst/>
+            </a:prstGeom>
+            <a:solidFill>
+              <a:srgbClr val="82A02E"/>
+            </a:solidFill>
+            <a:ln>
+              <a:noFill/>
+            </a:ln>
+          </p:spPr>
+          <p:style>
+            <a:lnRef idx="2">
+              <a:schemeClr val="accent1">
+                <a:shade val="50000"/>
+              </a:schemeClr>
+            </a:lnRef>
+            <a:fillRef idx="1">
+              <a:schemeClr val="accent1"/>
+            </a:fillRef>
+            <a:effectRef idx="0">
+              <a:schemeClr val="accent1"/>
+            </a:effectRef>
+            <a:fontRef idx="minor">
+              <a:schemeClr val="lt1"/>
+            </a:fontRef>
+          </p:style>
+          <p:txBody>
+            <a:bodyPr rtlCol="0" anchor="ctr"/>
+            <a:lstStyle/>
+            <a:p>
+              <a:pPr algn="ctr"/>
+              <a:endParaRPr lang="en-US"/>
+            </a:p>
+          </p:txBody>
+        </p:sp>
+        <p:cxnSp>
+          <p:nvCxnSpPr>
+            <p:cNvPr id="71" name="Straight Connector 70">
+              <a:extLst>
+                <a:ext uri="{FF2B5EF4-FFF2-40B4-BE49-F238E27FC236}">
+                  <a16:creationId xmlns:a16="http://schemas.microsoft.com/office/drawing/2014/main" id="{A6101601-8EFD-4941-8269-7C5C6C696F24}"/>
+                </a:ext>
+              </a:extLst>
+            </p:cNvPr>
+            <p:cNvCxnSpPr>
+              <a:cxnSpLocks/>
+            </p:cNvCxnSpPr>
+            <p:nvPr/>
+          </p:nvCxnSpPr>
+          <p:spPr>
+            <a:xfrm flipH="1" flipV="1">
+              <a:off x="212141" y="255753"/>
+              <a:ext cx="3332" cy="86350"/>
+            </a:xfrm>
+            <a:prstGeom prst="line">
+              <a:avLst/>
+            </a:prstGeom>
+          </p:spPr>
+          <p:style>
+            <a:lnRef idx="1">
+              <a:schemeClr val="accent1"/>
+            </a:lnRef>
+            <a:fillRef idx="0">
+              <a:schemeClr val="accent1"/>
+            </a:fillRef>
+            <a:effectRef idx="0">
+              <a:schemeClr val="accent1"/>
+            </a:effectRef>
+            <a:fontRef idx="minor">
+              <a:schemeClr val="tx1"/>
+            </a:fontRef>
+          </p:style>
+        </p:cxnSp>
+        <p:cxnSp>
+          <p:nvCxnSpPr>
+            <p:cNvPr id="72" name="Straight Connector 71">
+              <a:extLst>
+                <a:ext uri="{FF2B5EF4-FFF2-40B4-BE49-F238E27FC236}">
+                  <a16:creationId xmlns:a16="http://schemas.microsoft.com/office/drawing/2014/main" id="{8BFAFBC5-18EE-A24A-A309-2FF858BC8576}"/>
+                </a:ext>
+              </a:extLst>
+            </p:cNvPr>
+            <p:cNvCxnSpPr/>
+            <p:nvPr/>
+          </p:nvCxnSpPr>
+          <p:spPr>
+            <a:xfrm flipH="1" flipV="1">
+              <a:off x="231960" y="250046"/>
+              <a:ext cx="3332" cy="86350"/>
+            </a:xfrm>
+            <a:prstGeom prst="line">
+              <a:avLst/>
+            </a:prstGeom>
+          </p:spPr>
+          <p:style>
+            <a:lnRef idx="1">
+              <a:schemeClr val="accent1"/>
+            </a:lnRef>
+            <a:fillRef idx="0">
+              <a:schemeClr val="accent1"/>
+            </a:fillRef>
+            <a:effectRef idx="0">
+              <a:schemeClr val="accent1"/>
+            </a:effectRef>
+            <a:fontRef idx="minor">
+              <a:schemeClr val="tx1"/>
+            </a:fontRef>
+          </p:style>
+        </p:cxnSp>
+        <p:cxnSp>
+          <p:nvCxnSpPr>
+            <p:cNvPr id="73" name="Straight Connector 72">
+              <a:extLst>
+                <a:ext uri="{FF2B5EF4-FFF2-40B4-BE49-F238E27FC236}">
+                  <a16:creationId xmlns:a16="http://schemas.microsoft.com/office/drawing/2014/main" id="{C23C09F8-DC71-C241-96C0-EFFF40D46F0B}"/>
+                </a:ext>
+              </a:extLst>
+            </p:cNvPr>
+            <p:cNvCxnSpPr>
+              <a:cxnSpLocks/>
+            </p:cNvCxnSpPr>
+            <p:nvPr/>
+          </p:nvCxnSpPr>
+          <p:spPr>
+            <a:xfrm flipH="1" flipV="1">
+              <a:off x="250241" y="255753"/>
+              <a:ext cx="3332" cy="86350"/>
+            </a:xfrm>
+            <a:prstGeom prst="line">
+              <a:avLst/>
+            </a:prstGeom>
+          </p:spPr>
+          <p:style>
+            <a:lnRef idx="1">
+              <a:schemeClr val="accent1"/>
+            </a:lnRef>
+            <a:fillRef idx="0">
+              <a:schemeClr val="accent1"/>
+            </a:fillRef>
+            <a:effectRef idx="0">
+              <a:schemeClr val="accent1"/>
+            </a:effectRef>
+            <a:fontRef idx="minor">
+              <a:schemeClr val="tx1"/>
+            </a:fontRef>
+          </p:style>
+        </p:cxnSp>
+      </p:grpSp>
+      <p:grpSp>
+        <p:nvGrpSpPr>
+          <p:cNvPr id="74" name="Group 73">
+            <a:extLst>
+              <a:ext uri="{FF2B5EF4-FFF2-40B4-BE49-F238E27FC236}">
+                <a16:creationId xmlns:a16="http://schemas.microsoft.com/office/drawing/2014/main" id="{B20EED7F-94E5-AC4A-8C31-5C949C27EF07}"/>
+              </a:ext>
+            </a:extLst>
+          </p:cNvPr>
+          <p:cNvGrpSpPr/>
+          <p:nvPr/>
+        </p:nvGrpSpPr>
+        <p:grpSpPr>
+          <a:xfrm>
+            <a:off x="1727496" y="523798"/>
+            <a:ext cx="56056" cy="162129"/>
+            <a:chOff x="207264" y="250046"/>
+            <a:chExt cx="56056" cy="162129"/>
+          </a:xfrm>
+        </p:grpSpPr>
+        <p:sp>
+          <p:nvSpPr>
+            <p:cNvPr id="75" name="Oval 74">
+              <a:extLst>
+                <a:ext uri="{FF2B5EF4-FFF2-40B4-BE49-F238E27FC236}">
+                  <a16:creationId xmlns:a16="http://schemas.microsoft.com/office/drawing/2014/main" id="{56D4C77B-0C8A-D942-BDFE-B9889F8A60B5}"/>
+                </a:ext>
+              </a:extLst>
+            </p:cNvPr>
+            <p:cNvSpPr/>
+            <p:nvPr/>
+          </p:nvSpPr>
+          <p:spPr>
+            <a:xfrm>
+              <a:off x="207264" y="356119"/>
+              <a:ext cx="56056" cy="56056"/>
+            </a:xfrm>
+            <a:prstGeom prst="ellipse">
+              <a:avLst/>
+            </a:prstGeom>
+            <a:solidFill>
+              <a:srgbClr val="82A02E"/>
+            </a:solidFill>
+            <a:ln>
+              <a:noFill/>
+            </a:ln>
+          </p:spPr>
+          <p:style>
+            <a:lnRef idx="2">
+              <a:schemeClr val="accent1">
+                <a:shade val="50000"/>
+              </a:schemeClr>
+            </a:lnRef>
+            <a:fillRef idx="1">
+              <a:schemeClr val="accent1"/>
+            </a:fillRef>
+            <a:effectRef idx="0">
+              <a:schemeClr val="accent1"/>
+            </a:effectRef>
+            <a:fontRef idx="minor">
+              <a:schemeClr val="lt1"/>
+            </a:fontRef>
+          </p:style>
+          <p:txBody>
+            <a:bodyPr rtlCol="0" anchor="ctr"/>
+            <a:lstStyle/>
+            <a:p>
+              <a:pPr algn="ctr"/>
+              <a:endParaRPr lang="en-US"/>
+            </a:p>
+          </p:txBody>
+        </p:sp>
+        <p:cxnSp>
+          <p:nvCxnSpPr>
+            <p:cNvPr id="76" name="Straight Connector 75">
+              <a:extLst>
+                <a:ext uri="{FF2B5EF4-FFF2-40B4-BE49-F238E27FC236}">
+                  <a16:creationId xmlns:a16="http://schemas.microsoft.com/office/drawing/2014/main" id="{210A78D7-5C06-854C-904C-6C9AE238E6A3}"/>
+                </a:ext>
+              </a:extLst>
+            </p:cNvPr>
+            <p:cNvCxnSpPr>
+              <a:cxnSpLocks/>
+            </p:cNvCxnSpPr>
+            <p:nvPr/>
+          </p:nvCxnSpPr>
+          <p:spPr>
+            <a:xfrm flipH="1" flipV="1">
+              <a:off x="212141" y="255753"/>
+              <a:ext cx="3332" cy="86350"/>
+            </a:xfrm>
+            <a:prstGeom prst="line">
+              <a:avLst/>
+            </a:prstGeom>
+          </p:spPr>
+          <p:style>
+            <a:lnRef idx="1">
+              <a:schemeClr val="accent1"/>
+            </a:lnRef>
+            <a:fillRef idx="0">
+              <a:schemeClr val="accent1"/>
+            </a:fillRef>
+            <a:effectRef idx="0">
+              <a:schemeClr val="accent1"/>
+            </a:effectRef>
+            <a:fontRef idx="minor">
+              <a:schemeClr val="tx1"/>
+            </a:fontRef>
+          </p:style>
+        </p:cxnSp>
+        <p:cxnSp>
+          <p:nvCxnSpPr>
+            <p:cNvPr id="77" name="Straight Connector 76">
+              <a:extLst>
+                <a:ext uri="{FF2B5EF4-FFF2-40B4-BE49-F238E27FC236}">
+                  <a16:creationId xmlns:a16="http://schemas.microsoft.com/office/drawing/2014/main" id="{2867331E-5784-2048-B1B7-08903A769904}"/>
+                </a:ext>
+              </a:extLst>
+            </p:cNvPr>
+            <p:cNvCxnSpPr/>
+            <p:nvPr/>
+          </p:nvCxnSpPr>
+          <p:spPr>
+            <a:xfrm flipH="1" flipV="1">
+              <a:off x="231960" y="250046"/>
+              <a:ext cx="3332" cy="86350"/>
+            </a:xfrm>
+            <a:prstGeom prst="line">
+              <a:avLst/>
+            </a:prstGeom>
+          </p:spPr>
+          <p:style>
+            <a:lnRef idx="1">
+              <a:schemeClr val="accent1"/>
+            </a:lnRef>
+            <a:fillRef idx="0">
+              <a:schemeClr val="accent1"/>
+            </a:fillRef>
+            <a:effectRef idx="0">
+              <a:schemeClr val="accent1"/>
+            </a:effectRef>
+            <a:fontRef idx="minor">
+              <a:schemeClr val="tx1"/>
+            </a:fontRef>
+          </p:style>
+        </p:cxnSp>
+        <p:cxnSp>
+          <p:nvCxnSpPr>
+            <p:cNvPr id="78" name="Straight Connector 77">
+              <a:extLst>
+                <a:ext uri="{FF2B5EF4-FFF2-40B4-BE49-F238E27FC236}">
+                  <a16:creationId xmlns:a16="http://schemas.microsoft.com/office/drawing/2014/main" id="{59DD5412-8B04-9E4E-81DB-32DE3317B725}"/>
+                </a:ext>
+              </a:extLst>
+            </p:cNvPr>
+            <p:cNvCxnSpPr>
+              <a:cxnSpLocks/>
+            </p:cNvCxnSpPr>
+            <p:nvPr/>
+          </p:nvCxnSpPr>
+          <p:spPr>
+            <a:xfrm flipH="1" flipV="1">
+              <a:off x="250241" y="255753"/>
+              <a:ext cx="3332" cy="86350"/>
+            </a:xfrm>
+            <a:prstGeom prst="line">
+              <a:avLst/>
+            </a:prstGeom>
+          </p:spPr>
+          <p:style>
+            <a:lnRef idx="1">
+              <a:schemeClr val="accent1"/>
+            </a:lnRef>
+            <a:fillRef idx="0">
+              <a:schemeClr val="accent1"/>
+            </a:fillRef>
+            <a:effectRef idx="0">
+              <a:schemeClr val="accent1"/>
+            </a:effectRef>
+            <a:fontRef idx="minor">
+              <a:schemeClr val="tx1"/>
+            </a:fontRef>
+          </p:style>
+        </p:cxnSp>
+      </p:grpSp>
+      <p:grpSp>
+        <p:nvGrpSpPr>
+          <p:cNvPr id="79" name="Group 78">
+            <a:extLst>
+              <a:ext uri="{FF2B5EF4-FFF2-40B4-BE49-F238E27FC236}">
+                <a16:creationId xmlns:a16="http://schemas.microsoft.com/office/drawing/2014/main" id="{CB9442DD-1752-6E42-BC5C-C5B635D44105}"/>
+              </a:ext>
+            </a:extLst>
+          </p:cNvPr>
+          <p:cNvGrpSpPr/>
+          <p:nvPr/>
+        </p:nvGrpSpPr>
+        <p:grpSpPr>
+          <a:xfrm>
+            <a:off x="1868985" y="224283"/>
+            <a:ext cx="56056" cy="162129"/>
+            <a:chOff x="207264" y="250046"/>
+            <a:chExt cx="56056" cy="162129"/>
+          </a:xfrm>
+        </p:grpSpPr>
+        <p:sp>
+          <p:nvSpPr>
+            <p:cNvPr id="80" name="Oval 79">
+              <a:extLst>
+                <a:ext uri="{FF2B5EF4-FFF2-40B4-BE49-F238E27FC236}">
+                  <a16:creationId xmlns:a16="http://schemas.microsoft.com/office/drawing/2014/main" id="{BA40C3B0-9470-6447-8D06-807929D5A55F}"/>
+                </a:ext>
+              </a:extLst>
+            </p:cNvPr>
+            <p:cNvSpPr/>
+            <p:nvPr/>
+          </p:nvSpPr>
+          <p:spPr>
+            <a:xfrm>
+              <a:off x="207264" y="356119"/>
+              <a:ext cx="56056" cy="56056"/>
+            </a:xfrm>
+            <a:prstGeom prst="ellipse">
+              <a:avLst/>
+            </a:prstGeom>
+            <a:solidFill>
+              <a:srgbClr val="82A02E"/>
+            </a:solidFill>
+            <a:ln>
+              <a:noFill/>
+            </a:ln>
+          </p:spPr>
+          <p:style>
+            <a:lnRef idx="2">
+              <a:schemeClr val="accent1">
+                <a:shade val="50000"/>
+              </a:schemeClr>
+            </a:lnRef>
+            <a:fillRef idx="1">
+              <a:schemeClr val="accent1"/>
+            </a:fillRef>
+            <a:effectRef idx="0">
+              <a:schemeClr val="accent1"/>
+            </a:effectRef>
+            <a:fontRef idx="minor">
+              <a:schemeClr val="lt1"/>
+            </a:fontRef>
+          </p:style>
+          <p:txBody>
+            <a:bodyPr rtlCol="0" anchor="ctr"/>
+            <a:lstStyle/>
+            <a:p>
+              <a:pPr algn="ctr"/>
+              <a:endParaRPr lang="en-US"/>
+            </a:p>
+          </p:txBody>
+        </p:sp>
+        <p:cxnSp>
+          <p:nvCxnSpPr>
+            <p:cNvPr id="81" name="Straight Connector 80">
+              <a:extLst>
+                <a:ext uri="{FF2B5EF4-FFF2-40B4-BE49-F238E27FC236}">
+                  <a16:creationId xmlns:a16="http://schemas.microsoft.com/office/drawing/2014/main" id="{CC46E837-BB19-0D4C-B3AF-1303F381F2A4}"/>
+                </a:ext>
+              </a:extLst>
+            </p:cNvPr>
+            <p:cNvCxnSpPr>
+              <a:cxnSpLocks/>
+            </p:cNvCxnSpPr>
+            <p:nvPr/>
+          </p:nvCxnSpPr>
+          <p:spPr>
+            <a:xfrm flipH="1" flipV="1">
+              <a:off x="212141" y="255753"/>
+              <a:ext cx="3332" cy="86350"/>
+            </a:xfrm>
+            <a:prstGeom prst="line">
+              <a:avLst/>
+            </a:prstGeom>
+          </p:spPr>
+          <p:style>
+            <a:lnRef idx="1">
+              <a:schemeClr val="accent1"/>
+            </a:lnRef>
+            <a:fillRef idx="0">
+              <a:schemeClr val="accent1"/>
+            </a:fillRef>
+            <a:effectRef idx="0">
+              <a:schemeClr val="accent1"/>
+            </a:effectRef>
+            <a:fontRef idx="minor">
+              <a:schemeClr val="tx1"/>
+            </a:fontRef>
+          </p:style>
+        </p:cxnSp>
+        <p:cxnSp>
+          <p:nvCxnSpPr>
+            <p:cNvPr id="82" name="Straight Connector 81">
+              <a:extLst>
+                <a:ext uri="{FF2B5EF4-FFF2-40B4-BE49-F238E27FC236}">
+                  <a16:creationId xmlns:a16="http://schemas.microsoft.com/office/drawing/2014/main" id="{627C6CA4-0346-B942-96C3-B3AA314CD39F}"/>
+                </a:ext>
+              </a:extLst>
+            </p:cNvPr>
+            <p:cNvCxnSpPr/>
+            <p:nvPr/>
+          </p:nvCxnSpPr>
+          <p:spPr>
+            <a:xfrm flipH="1" flipV="1">
+              <a:off x="231960" y="250046"/>
+              <a:ext cx="3332" cy="86350"/>
+            </a:xfrm>
+            <a:prstGeom prst="line">
+              <a:avLst/>
+            </a:prstGeom>
+          </p:spPr>
+          <p:style>
+            <a:lnRef idx="1">
+              <a:schemeClr val="accent1"/>
+            </a:lnRef>
+            <a:fillRef idx="0">
+              <a:schemeClr val="accent1"/>
+            </a:fillRef>
+            <a:effectRef idx="0">
+              <a:schemeClr val="accent1"/>
+            </a:effectRef>
+            <a:fontRef idx="minor">
+              <a:schemeClr val="tx1"/>
+            </a:fontRef>
+          </p:style>
+        </p:cxnSp>
+        <p:cxnSp>
+          <p:nvCxnSpPr>
+            <p:cNvPr id="83" name="Straight Connector 82">
+              <a:extLst>
+                <a:ext uri="{FF2B5EF4-FFF2-40B4-BE49-F238E27FC236}">
+                  <a16:creationId xmlns:a16="http://schemas.microsoft.com/office/drawing/2014/main" id="{09EDE165-D0B2-0245-B2EA-1FF35ACDE7E4}"/>
+                </a:ext>
+              </a:extLst>
+            </p:cNvPr>
+            <p:cNvCxnSpPr>
+              <a:cxnSpLocks/>
+            </p:cNvCxnSpPr>
+            <p:nvPr/>
+          </p:nvCxnSpPr>
+          <p:spPr>
+            <a:xfrm flipH="1" flipV="1">
+              <a:off x="250241" y="255753"/>
+              <a:ext cx="3332" cy="86350"/>
+            </a:xfrm>
+            <a:prstGeom prst="line">
+              <a:avLst/>
+            </a:prstGeom>
+          </p:spPr>
+          <p:style>
+            <a:lnRef idx="1">
+              <a:schemeClr val="accent1"/>
+            </a:lnRef>
+            <a:fillRef idx="0">
+              <a:schemeClr val="accent1"/>
+            </a:fillRef>
+            <a:effectRef idx="0">
+              <a:schemeClr val="accent1"/>
+            </a:effectRef>
+            <a:fontRef idx="minor">
+              <a:schemeClr val="tx1"/>
+            </a:fontRef>
+          </p:style>
+        </p:cxnSp>
+      </p:grpSp>
+      <p:grpSp>
+        <p:nvGrpSpPr>
+          <p:cNvPr id="84" name="Group 83">
+            <a:extLst>
+              <a:ext uri="{FF2B5EF4-FFF2-40B4-BE49-F238E27FC236}">
+                <a16:creationId xmlns:a16="http://schemas.microsoft.com/office/drawing/2014/main" id="{DD1B11DA-01A9-2E49-825B-A211692F9653}"/>
+              </a:ext>
+            </a:extLst>
+          </p:cNvPr>
+          <p:cNvGrpSpPr/>
+          <p:nvPr/>
+        </p:nvGrpSpPr>
+        <p:grpSpPr>
+          <a:xfrm>
+            <a:off x="2050960" y="363387"/>
+            <a:ext cx="56056" cy="162129"/>
+            <a:chOff x="207264" y="250046"/>
+            <a:chExt cx="56056" cy="162129"/>
+          </a:xfrm>
+        </p:grpSpPr>
+        <p:sp>
+          <p:nvSpPr>
+            <p:cNvPr id="85" name="Oval 84">
+              <a:extLst>
+                <a:ext uri="{FF2B5EF4-FFF2-40B4-BE49-F238E27FC236}">
+                  <a16:creationId xmlns:a16="http://schemas.microsoft.com/office/drawing/2014/main" id="{1C06644C-5624-2D4E-9E72-AF21D39C4FEC}"/>
+                </a:ext>
+              </a:extLst>
+            </p:cNvPr>
+            <p:cNvSpPr/>
+            <p:nvPr/>
+          </p:nvSpPr>
+          <p:spPr>
+            <a:xfrm>
+              <a:off x="207264" y="356119"/>
+              <a:ext cx="56056" cy="56056"/>
+            </a:xfrm>
+            <a:prstGeom prst="ellipse">
+              <a:avLst/>
+            </a:prstGeom>
+            <a:solidFill>
+              <a:srgbClr val="82A02E"/>
+            </a:solidFill>
+            <a:ln>
+              <a:noFill/>
+            </a:ln>
+          </p:spPr>
+          <p:style>
+            <a:lnRef idx="2">
+              <a:schemeClr val="accent1">
+                <a:shade val="50000"/>
+              </a:schemeClr>
+            </a:lnRef>
+            <a:fillRef idx="1">
+              <a:schemeClr val="accent1"/>
+            </a:fillRef>
+            <a:effectRef idx="0">
+              <a:schemeClr val="accent1"/>
+            </a:effectRef>
+            <a:fontRef idx="minor">
+              <a:schemeClr val="lt1"/>
+            </a:fontRef>
+          </p:style>
+          <p:txBody>
+            <a:bodyPr rtlCol="0" anchor="ctr"/>
+            <a:lstStyle/>
+            <a:p>
+              <a:pPr algn="ctr"/>
+              <a:endParaRPr lang="en-US"/>
+            </a:p>
+          </p:txBody>
+        </p:sp>
+        <p:cxnSp>
+          <p:nvCxnSpPr>
+            <p:cNvPr id="86" name="Straight Connector 85">
+              <a:extLst>
+                <a:ext uri="{FF2B5EF4-FFF2-40B4-BE49-F238E27FC236}">
+                  <a16:creationId xmlns:a16="http://schemas.microsoft.com/office/drawing/2014/main" id="{EA230E19-2AD8-4443-97A4-BD9391250CEF}"/>
+                </a:ext>
+              </a:extLst>
+            </p:cNvPr>
+            <p:cNvCxnSpPr>
+              <a:cxnSpLocks/>
+            </p:cNvCxnSpPr>
+            <p:nvPr/>
+          </p:nvCxnSpPr>
+          <p:spPr>
+            <a:xfrm flipH="1" flipV="1">
+              <a:off x="212141" y="255753"/>
+              <a:ext cx="3332" cy="86350"/>
+            </a:xfrm>
+            <a:prstGeom prst="line">
+              <a:avLst/>
+            </a:prstGeom>
+          </p:spPr>
+          <p:style>
+            <a:lnRef idx="1">
+              <a:schemeClr val="accent1"/>
+            </a:lnRef>
+            <a:fillRef idx="0">
+              <a:schemeClr val="accent1"/>
+            </a:fillRef>
+            <a:effectRef idx="0">
+              <a:schemeClr val="accent1"/>
+            </a:effectRef>
+            <a:fontRef idx="minor">
+              <a:schemeClr val="tx1"/>
+            </a:fontRef>
+          </p:style>
+        </p:cxnSp>
+        <p:cxnSp>
+          <p:nvCxnSpPr>
+            <p:cNvPr id="87" name="Straight Connector 86">
+              <a:extLst>
+                <a:ext uri="{FF2B5EF4-FFF2-40B4-BE49-F238E27FC236}">
+                  <a16:creationId xmlns:a16="http://schemas.microsoft.com/office/drawing/2014/main" id="{135E5716-B2A1-904F-B09C-7E2F2BB217B5}"/>
+                </a:ext>
+              </a:extLst>
+            </p:cNvPr>
+            <p:cNvCxnSpPr/>
+            <p:nvPr/>
+          </p:nvCxnSpPr>
+          <p:spPr>
+            <a:xfrm flipH="1" flipV="1">
+              <a:off x="231960" y="250046"/>
+              <a:ext cx="3332" cy="86350"/>
+            </a:xfrm>
+            <a:prstGeom prst="line">
+              <a:avLst/>
+            </a:prstGeom>
+          </p:spPr>
+          <p:style>
+            <a:lnRef idx="1">
+              <a:schemeClr val="accent1"/>
+            </a:lnRef>
+            <a:fillRef idx="0">
+              <a:schemeClr val="accent1"/>
+            </a:fillRef>
+            <a:effectRef idx="0">
+              <a:schemeClr val="accent1"/>
+            </a:effectRef>
+            <a:fontRef idx="minor">
+              <a:schemeClr val="tx1"/>
+            </a:fontRef>
+          </p:style>
+        </p:cxnSp>
+        <p:cxnSp>
+          <p:nvCxnSpPr>
+            <p:cNvPr id="88" name="Straight Connector 87">
+              <a:extLst>
+                <a:ext uri="{FF2B5EF4-FFF2-40B4-BE49-F238E27FC236}">
+                  <a16:creationId xmlns:a16="http://schemas.microsoft.com/office/drawing/2014/main" id="{01303D9D-B53F-7A47-873E-AB934069D484}"/>
+                </a:ext>
+              </a:extLst>
+            </p:cNvPr>
+            <p:cNvCxnSpPr>
+              <a:cxnSpLocks/>
+            </p:cNvCxnSpPr>
+            <p:nvPr/>
+          </p:nvCxnSpPr>
+          <p:spPr>
+            <a:xfrm flipH="1" flipV="1">
+              <a:off x="250241" y="255753"/>
+              <a:ext cx="3332" cy="86350"/>
+            </a:xfrm>
+            <a:prstGeom prst="line">
+              <a:avLst/>
+            </a:prstGeom>
+          </p:spPr>
+          <p:style>
+            <a:lnRef idx="1">
+              <a:schemeClr val="accent1"/>
+            </a:lnRef>
+            <a:fillRef idx="0">
+              <a:schemeClr val="accent1"/>
+            </a:fillRef>
+            <a:effectRef idx="0">
+              <a:schemeClr val="accent1"/>
+            </a:effectRef>
+            <a:fontRef idx="minor">
+              <a:schemeClr val="tx1"/>
+            </a:fontRef>
+          </p:style>
+        </p:cxnSp>
+      </p:grpSp>
+      <p:grpSp>
+        <p:nvGrpSpPr>
+          <p:cNvPr id="89" name="Group 88">
+            <a:extLst>
+              <a:ext uri="{FF2B5EF4-FFF2-40B4-BE49-F238E27FC236}">
+                <a16:creationId xmlns:a16="http://schemas.microsoft.com/office/drawing/2014/main" id="{1B92E7EF-3208-CB44-8E34-2B5D7EEBAC96}"/>
+              </a:ext>
+            </a:extLst>
+          </p:cNvPr>
+          <p:cNvGrpSpPr/>
+          <p:nvPr/>
+        </p:nvGrpSpPr>
+        <p:grpSpPr>
+          <a:xfrm>
+            <a:off x="1504566" y="589564"/>
+            <a:ext cx="56056" cy="162129"/>
+            <a:chOff x="207264" y="250046"/>
+            <a:chExt cx="56056" cy="162129"/>
+          </a:xfrm>
+        </p:grpSpPr>
+        <p:sp>
+          <p:nvSpPr>
+            <p:cNvPr id="90" name="Oval 89">
+              <a:extLst>
+                <a:ext uri="{FF2B5EF4-FFF2-40B4-BE49-F238E27FC236}">
+                  <a16:creationId xmlns:a16="http://schemas.microsoft.com/office/drawing/2014/main" id="{E5CAEC9A-8912-BE47-B900-3E015588B716}"/>
+                </a:ext>
+              </a:extLst>
+            </p:cNvPr>
+            <p:cNvSpPr/>
+            <p:nvPr/>
+          </p:nvSpPr>
+          <p:spPr>
+            <a:xfrm>
+              <a:off x="207264" y="356119"/>
+              <a:ext cx="56056" cy="56056"/>
+            </a:xfrm>
+            <a:prstGeom prst="ellipse">
+              <a:avLst/>
+            </a:prstGeom>
+            <a:solidFill>
+              <a:srgbClr val="82A02E"/>
+            </a:solidFill>
+            <a:ln>
+              <a:noFill/>
+            </a:ln>
+          </p:spPr>
+          <p:style>
+            <a:lnRef idx="2">
+              <a:schemeClr val="accent1">
+                <a:shade val="50000"/>
+              </a:schemeClr>
+            </a:lnRef>
+            <a:fillRef idx="1">
+              <a:schemeClr val="accent1"/>
+            </a:fillRef>
+            <a:effectRef idx="0">
+              <a:schemeClr val="accent1"/>
+            </a:effectRef>
+            <a:fontRef idx="minor">
+              <a:schemeClr val="lt1"/>
+            </a:fontRef>
+          </p:style>
+          <p:txBody>
+            <a:bodyPr rtlCol="0" anchor="ctr"/>
+            <a:lstStyle/>
+            <a:p>
+              <a:pPr algn="ctr"/>
+              <a:endParaRPr lang="en-US"/>
+            </a:p>
+          </p:txBody>
+        </p:sp>
+        <p:cxnSp>
+          <p:nvCxnSpPr>
+            <p:cNvPr id="91" name="Straight Connector 90">
+              <a:extLst>
+                <a:ext uri="{FF2B5EF4-FFF2-40B4-BE49-F238E27FC236}">
+                  <a16:creationId xmlns:a16="http://schemas.microsoft.com/office/drawing/2014/main" id="{59F8D968-6371-E84C-B7C6-29DB170044FD}"/>
+                </a:ext>
+              </a:extLst>
+            </p:cNvPr>
+            <p:cNvCxnSpPr>
+              <a:cxnSpLocks/>
+            </p:cNvCxnSpPr>
+            <p:nvPr/>
+          </p:nvCxnSpPr>
+          <p:spPr>
+            <a:xfrm flipH="1" flipV="1">
+              <a:off x="212141" y="255753"/>
+              <a:ext cx="3332" cy="86350"/>
+            </a:xfrm>
+            <a:prstGeom prst="line">
+              <a:avLst/>
+            </a:prstGeom>
+          </p:spPr>
+          <p:style>
+            <a:lnRef idx="1">
+              <a:schemeClr val="accent1"/>
+            </a:lnRef>
+            <a:fillRef idx="0">
+              <a:schemeClr val="accent1"/>
+            </a:fillRef>
+            <a:effectRef idx="0">
+              <a:schemeClr val="accent1"/>
+            </a:effectRef>
+            <a:fontRef idx="minor">
+              <a:schemeClr val="tx1"/>
+            </a:fontRef>
+          </p:style>
+        </p:cxnSp>
+        <p:cxnSp>
+          <p:nvCxnSpPr>
+            <p:cNvPr id="92" name="Straight Connector 91">
+              <a:extLst>
+                <a:ext uri="{FF2B5EF4-FFF2-40B4-BE49-F238E27FC236}">
+                  <a16:creationId xmlns:a16="http://schemas.microsoft.com/office/drawing/2014/main" id="{BD363669-7AA3-AA4C-ACD1-0A40D8036204}"/>
+                </a:ext>
+              </a:extLst>
+            </p:cNvPr>
+            <p:cNvCxnSpPr/>
+            <p:nvPr/>
+          </p:nvCxnSpPr>
+          <p:spPr>
+            <a:xfrm flipH="1" flipV="1">
+              <a:off x="231960" y="250046"/>
+              <a:ext cx="3332" cy="86350"/>
+            </a:xfrm>
+            <a:prstGeom prst="line">
+              <a:avLst/>
+            </a:prstGeom>
+          </p:spPr>
+          <p:style>
+            <a:lnRef idx="1">
+              <a:schemeClr val="accent1"/>
+            </a:lnRef>
+            <a:fillRef idx="0">
+              <a:schemeClr val="accent1"/>
+            </a:fillRef>
+            <a:effectRef idx="0">
+              <a:schemeClr val="accent1"/>
+            </a:effectRef>
+            <a:fontRef idx="minor">
+              <a:schemeClr val="tx1"/>
+            </a:fontRef>
+          </p:style>
+        </p:cxnSp>
+        <p:cxnSp>
+          <p:nvCxnSpPr>
+            <p:cNvPr id="93" name="Straight Connector 92">
+              <a:extLst>
+                <a:ext uri="{FF2B5EF4-FFF2-40B4-BE49-F238E27FC236}">
+                  <a16:creationId xmlns:a16="http://schemas.microsoft.com/office/drawing/2014/main" id="{FBE4340E-8658-C649-9E12-21444D4C815C}"/>
+                </a:ext>
+              </a:extLst>
+            </p:cNvPr>
+            <p:cNvCxnSpPr>
+              <a:cxnSpLocks/>
+            </p:cNvCxnSpPr>
+            <p:nvPr/>
+          </p:nvCxnSpPr>
+          <p:spPr>
+            <a:xfrm flipH="1" flipV="1">
+              <a:off x="250241" y="255753"/>
+              <a:ext cx="3332" cy="86350"/>
+            </a:xfrm>
+            <a:prstGeom prst="line">
+              <a:avLst/>
+            </a:prstGeom>
+          </p:spPr>
+          <p:style>
+            <a:lnRef idx="1">
+              <a:schemeClr val="accent1"/>
+            </a:lnRef>
+            <a:fillRef idx="0">
+              <a:schemeClr val="accent1"/>
+            </a:fillRef>
+            <a:effectRef idx="0">
+              <a:schemeClr val="accent1"/>
+            </a:effectRef>
+            <a:fontRef idx="minor">
+              <a:schemeClr val="tx1"/>
+            </a:fontRef>
+          </p:style>
+        </p:cxnSp>
+      </p:grpSp>
+      <p:sp>
+        <p:nvSpPr>
+          <p:cNvPr id="94" name="Down Arrow 93">
+            <a:extLst>
+              <a:ext uri="{FF2B5EF4-FFF2-40B4-BE49-F238E27FC236}">
+                <a16:creationId xmlns:a16="http://schemas.microsoft.com/office/drawing/2014/main" id="{663773D9-4D43-B045-9CF3-0BD6F68AF4D6}"/>
+              </a:ext>
+            </a:extLst>
+          </p:cNvPr>
+          <p:cNvSpPr/>
+          <p:nvPr/>
+        </p:nvSpPr>
+        <p:spPr>
+          <a:xfrm>
+            <a:off x="1674290" y="38226"/>
+            <a:ext cx="182668" cy="299923"/>
+          </a:xfrm>
+          <a:prstGeom prst="downArrow">
+            <a:avLst/>
+          </a:prstGeom>
+        </p:spPr>
+        <p:style>
+          <a:lnRef idx="2">
+            <a:schemeClr val="accent1">
+              <a:shade val="50000"/>
+            </a:schemeClr>
+          </a:lnRef>
+          <a:fillRef idx="1">
+            <a:schemeClr val="accent1"/>
+          </a:fillRef>
+          <a:effectRef idx="0">
+            <a:schemeClr val="accent1"/>
+          </a:effectRef>
+          <a:fontRef idx="minor">
+            <a:schemeClr val="lt1"/>
+          </a:fontRef>
+        </p:style>
+        <p:txBody>
+          <a:bodyPr rtlCol="0" anchor="ctr"/>
+          <a:lstStyle/>
+          <a:p>
+            <a:pPr algn="ctr"/>
+            <a:endParaRPr lang="en-US"/>
+          </a:p>
+        </p:txBody>
+      </p:sp>
+      <p:sp>
+        <p:nvSpPr>
+          <p:cNvPr id="95" name="Down Arrow 94">
+            <a:extLst>
+              <a:ext uri="{FF2B5EF4-FFF2-40B4-BE49-F238E27FC236}">
+                <a16:creationId xmlns:a16="http://schemas.microsoft.com/office/drawing/2014/main" id="{605B5EAF-B704-7349-A992-2BE00DC16290}"/>
+              </a:ext>
+            </a:extLst>
+          </p:cNvPr>
+          <p:cNvSpPr/>
+          <p:nvPr/>
+        </p:nvSpPr>
+        <p:spPr>
+          <a:xfrm>
+            <a:off x="2881395" y="38225"/>
+            <a:ext cx="182668" cy="299923"/>
+          </a:xfrm>
+          <a:prstGeom prst="downArrow">
+            <a:avLst/>
+          </a:prstGeom>
+        </p:spPr>
+        <p:style>
+          <a:lnRef idx="2">
+            <a:schemeClr val="accent1">
+              <a:shade val="50000"/>
+            </a:schemeClr>
+          </a:lnRef>
+          <a:fillRef idx="1">
+            <a:schemeClr val="accent1"/>
+          </a:fillRef>
+          <a:effectRef idx="0">
+            <a:schemeClr val="accent1"/>
+          </a:effectRef>
+          <a:fontRef idx="minor">
+            <a:schemeClr val="lt1"/>
+          </a:fontRef>
+        </p:style>
+        <p:txBody>
+          <a:bodyPr rtlCol="0" anchor="ctr"/>
+          <a:lstStyle/>
+          <a:p>
+            <a:pPr algn="ctr"/>
+            <a:endParaRPr lang="en-US"/>
+          </a:p>
+        </p:txBody>
+      </p:sp>
+      <p:grpSp>
+        <p:nvGrpSpPr>
+          <p:cNvPr id="98" name="Group 97">
+            <a:extLst>
+              <a:ext uri="{FF2B5EF4-FFF2-40B4-BE49-F238E27FC236}">
+                <a16:creationId xmlns:a16="http://schemas.microsoft.com/office/drawing/2014/main" id="{30499EEE-54DD-704E-A1B1-6CD38DD6067C}"/>
+              </a:ext>
+            </a:extLst>
+          </p:cNvPr>
+          <p:cNvGrpSpPr/>
+          <p:nvPr/>
+        </p:nvGrpSpPr>
+        <p:grpSpPr>
+          <a:xfrm>
+            <a:off x="2745830" y="280339"/>
+            <a:ext cx="56056" cy="162129"/>
+            <a:chOff x="207264" y="250046"/>
+            <a:chExt cx="56056" cy="162129"/>
+          </a:xfrm>
+        </p:grpSpPr>
+        <p:sp>
+          <p:nvSpPr>
+            <p:cNvPr id="99" name="Oval 98">
+              <a:extLst>
+                <a:ext uri="{FF2B5EF4-FFF2-40B4-BE49-F238E27FC236}">
+                  <a16:creationId xmlns:a16="http://schemas.microsoft.com/office/drawing/2014/main" id="{5F014DF3-FE91-FB43-94FB-AB5C31D48AD9}"/>
+                </a:ext>
+              </a:extLst>
+            </p:cNvPr>
+            <p:cNvSpPr/>
+            <p:nvPr/>
+          </p:nvSpPr>
+          <p:spPr>
+            <a:xfrm>
+              <a:off x="207264" y="356119"/>
+              <a:ext cx="56056" cy="56056"/>
+            </a:xfrm>
+            <a:prstGeom prst="ellipse">
+              <a:avLst/>
+            </a:prstGeom>
+            <a:solidFill>
+              <a:srgbClr val="EB6235"/>
+            </a:solidFill>
+            <a:ln>
+              <a:noFill/>
+            </a:ln>
+          </p:spPr>
+          <p:style>
+            <a:lnRef idx="2">
+              <a:schemeClr val="accent1">
+                <a:shade val="50000"/>
+              </a:schemeClr>
+            </a:lnRef>
+            <a:fillRef idx="1">
+              <a:schemeClr val="accent1"/>
+            </a:fillRef>
+            <a:effectRef idx="0">
+              <a:schemeClr val="accent1"/>
+            </a:effectRef>
+            <a:fontRef idx="minor">
+              <a:schemeClr val="lt1"/>
+            </a:fontRef>
+          </p:style>
+          <p:txBody>
+            <a:bodyPr rtlCol="0" anchor="ctr"/>
+            <a:lstStyle/>
+            <a:p>
+              <a:pPr algn="ctr"/>
+              <a:endParaRPr lang="en-US"/>
+            </a:p>
+          </p:txBody>
+        </p:sp>
+        <p:cxnSp>
+          <p:nvCxnSpPr>
+            <p:cNvPr id="100" name="Straight Connector 99">
+              <a:extLst>
+                <a:ext uri="{FF2B5EF4-FFF2-40B4-BE49-F238E27FC236}">
+                  <a16:creationId xmlns:a16="http://schemas.microsoft.com/office/drawing/2014/main" id="{740A4834-CF89-B24A-AF85-EFA2CE116E1A}"/>
+                </a:ext>
+              </a:extLst>
+            </p:cNvPr>
+            <p:cNvCxnSpPr>
+              <a:cxnSpLocks/>
+            </p:cNvCxnSpPr>
+            <p:nvPr/>
+          </p:nvCxnSpPr>
+          <p:spPr>
+            <a:xfrm flipH="1" flipV="1">
+              <a:off x="212141" y="255753"/>
+              <a:ext cx="3332" cy="86350"/>
+            </a:xfrm>
+            <a:prstGeom prst="line">
+              <a:avLst/>
+            </a:prstGeom>
+          </p:spPr>
+          <p:style>
+            <a:lnRef idx="1">
+              <a:schemeClr val="accent1"/>
+            </a:lnRef>
+            <a:fillRef idx="0">
+              <a:schemeClr val="accent1"/>
+            </a:fillRef>
+            <a:effectRef idx="0">
+              <a:schemeClr val="accent1"/>
+            </a:effectRef>
+            <a:fontRef idx="minor">
+              <a:schemeClr val="tx1"/>
+            </a:fontRef>
+          </p:style>
+        </p:cxnSp>
+        <p:cxnSp>
+          <p:nvCxnSpPr>
+            <p:cNvPr id="101" name="Straight Connector 100">
+              <a:extLst>
+                <a:ext uri="{FF2B5EF4-FFF2-40B4-BE49-F238E27FC236}">
+                  <a16:creationId xmlns:a16="http://schemas.microsoft.com/office/drawing/2014/main" id="{438C5CA9-68D9-7948-953F-18ADDCF21511}"/>
+                </a:ext>
+              </a:extLst>
+            </p:cNvPr>
+            <p:cNvCxnSpPr/>
+            <p:nvPr/>
+          </p:nvCxnSpPr>
+          <p:spPr>
+            <a:xfrm flipH="1" flipV="1">
+              <a:off x="231960" y="250046"/>
+              <a:ext cx="3332" cy="86350"/>
+            </a:xfrm>
+            <a:prstGeom prst="line">
+              <a:avLst/>
+            </a:prstGeom>
+          </p:spPr>
+          <p:style>
+            <a:lnRef idx="1">
+              <a:schemeClr val="accent1"/>
+            </a:lnRef>
+            <a:fillRef idx="0">
+              <a:schemeClr val="accent1"/>
+            </a:fillRef>
+            <a:effectRef idx="0">
+              <a:schemeClr val="accent1"/>
+            </a:effectRef>
+            <a:fontRef idx="minor">
+              <a:schemeClr val="tx1"/>
+            </a:fontRef>
+          </p:style>
+        </p:cxnSp>
+        <p:cxnSp>
+          <p:nvCxnSpPr>
+            <p:cNvPr id="102" name="Straight Connector 101">
+              <a:extLst>
+                <a:ext uri="{FF2B5EF4-FFF2-40B4-BE49-F238E27FC236}">
+                  <a16:creationId xmlns:a16="http://schemas.microsoft.com/office/drawing/2014/main" id="{B9E97E6E-9359-4F45-BA44-42B56266B2A5}"/>
+                </a:ext>
+              </a:extLst>
+            </p:cNvPr>
+            <p:cNvCxnSpPr>
+              <a:cxnSpLocks/>
+            </p:cNvCxnSpPr>
+            <p:nvPr/>
+          </p:nvCxnSpPr>
+          <p:spPr>
+            <a:xfrm flipH="1" flipV="1">
+              <a:off x="250241" y="255753"/>
+              <a:ext cx="3332" cy="86350"/>
+            </a:xfrm>
+            <a:prstGeom prst="line">
+              <a:avLst/>
+            </a:prstGeom>
+          </p:spPr>
+          <p:style>
+            <a:lnRef idx="1">
+              <a:schemeClr val="accent1"/>
+            </a:lnRef>
+            <a:fillRef idx="0">
+              <a:schemeClr val="accent1"/>
+            </a:fillRef>
+            <a:effectRef idx="0">
+              <a:schemeClr val="accent1"/>
+            </a:effectRef>
+            <a:fontRef idx="minor">
+              <a:schemeClr val="tx1"/>
+            </a:fontRef>
+          </p:style>
+        </p:cxnSp>
+      </p:grpSp>
+      <p:grpSp>
+        <p:nvGrpSpPr>
+          <p:cNvPr id="103" name="Group 102">
+            <a:extLst>
+              <a:ext uri="{FF2B5EF4-FFF2-40B4-BE49-F238E27FC236}">
+                <a16:creationId xmlns:a16="http://schemas.microsoft.com/office/drawing/2014/main" id="{F262F7F3-75F3-4F4B-B3EA-DEA98CD19204}"/>
+              </a:ext>
+            </a:extLst>
+          </p:cNvPr>
+          <p:cNvGrpSpPr/>
+          <p:nvPr/>
+        </p:nvGrpSpPr>
+        <p:grpSpPr>
+          <a:xfrm>
+            <a:off x="2898230" y="432739"/>
+            <a:ext cx="56056" cy="162129"/>
+            <a:chOff x="207264" y="250046"/>
+            <a:chExt cx="56056" cy="162129"/>
+          </a:xfrm>
+        </p:grpSpPr>
+        <p:sp>
+          <p:nvSpPr>
+            <p:cNvPr id="104" name="Oval 103">
+              <a:extLst>
+                <a:ext uri="{FF2B5EF4-FFF2-40B4-BE49-F238E27FC236}">
+                  <a16:creationId xmlns:a16="http://schemas.microsoft.com/office/drawing/2014/main" id="{D839D8F5-C412-064A-AF72-D13E2D94CBAA}"/>
+                </a:ext>
+              </a:extLst>
+            </p:cNvPr>
+            <p:cNvSpPr/>
+            <p:nvPr/>
+          </p:nvSpPr>
+          <p:spPr>
+            <a:xfrm>
+              <a:off x="207264" y="356119"/>
+              <a:ext cx="56056" cy="56056"/>
+            </a:xfrm>
+            <a:prstGeom prst="ellipse">
+              <a:avLst/>
+            </a:prstGeom>
+            <a:solidFill>
+              <a:srgbClr val="EB6235"/>
+            </a:solidFill>
+            <a:ln>
+              <a:noFill/>
+            </a:ln>
+          </p:spPr>
+          <p:style>
+            <a:lnRef idx="2">
+              <a:schemeClr val="accent1">
+                <a:shade val="50000"/>
+              </a:schemeClr>
+            </a:lnRef>
+            <a:fillRef idx="1">
+              <a:schemeClr val="accent1"/>
+            </a:fillRef>
+            <a:effectRef idx="0">
+              <a:schemeClr val="accent1"/>
+            </a:effectRef>
+            <a:fontRef idx="minor">
+              <a:schemeClr val="lt1"/>
+            </a:fontRef>
+          </p:style>
+          <p:txBody>
+            <a:bodyPr rtlCol="0" anchor="ctr"/>
+            <a:lstStyle/>
+            <a:p>
+              <a:pPr algn="ctr"/>
+              <a:endParaRPr lang="en-US"/>
+            </a:p>
+          </p:txBody>
+        </p:sp>
+        <p:cxnSp>
+          <p:nvCxnSpPr>
+            <p:cNvPr id="105" name="Straight Connector 104">
+              <a:extLst>
+                <a:ext uri="{FF2B5EF4-FFF2-40B4-BE49-F238E27FC236}">
+                  <a16:creationId xmlns:a16="http://schemas.microsoft.com/office/drawing/2014/main" id="{7E1538C8-FA90-1549-97E3-76AF3B7406D8}"/>
+                </a:ext>
+              </a:extLst>
+            </p:cNvPr>
+            <p:cNvCxnSpPr>
+              <a:cxnSpLocks/>
+            </p:cNvCxnSpPr>
+            <p:nvPr/>
+          </p:nvCxnSpPr>
+          <p:spPr>
+            <a:xfrm flipH="1" flipV="1">
+              <a:off x="212141" y="255753"/>
+              <a:ext cx="3332" cy="86350"/>
+            </a:xfrm>
+            <a:prstGeom prst="line">
+              <a:avLst/>
+            </a:prstGeom>
+          </p:spPr>
+          <p:style>
+            <a:lnRef idx="1">
+              <a:schemeClr val="accent1"/>
+            </a:lnRef>
+            <a:fillRef idx="0">
+              <a:schemeClr val="accent1"/>
+            </a:fillRef>
+            <a:effectRef idx="0">
+              <a:schemeClr val="accent1"/>
+            </a:effectRef>
+            <a:fontRef idx="minor">
+              <a:schemeClr val="tx1"/>
+            </a:fontRef>
+          </p:style>
+        </p:cxnSp>
+        <p:cxnSp>
+          <p:nvCxnSpPr>
+            <p:cNvPr id="106" name="Straight Connector 105">
+              <a:extLst>
+                <a:ext uri="{FF2B5EF4-FFF2-40B4-BE49-F238E27FC236}">
+                  <a16:creationId xmlns:a16="http://schemas.microsoft.com/office/drawing/2014/main" id="{38BDAC3B-1A0F-884D-95BA-856D51424BF5}"/>
+                </a:ext>
+              </a:extLst>
+            </p:cNvPr>
+            <p:cNvCxnSpPr/>
+            <p:nvPr/>
+          </p:nvCxnSpPr>
+          <p:spPr>
+            <a:xfrm flipH="1" flipV="1">
+              <a:off x="231960" y="250046"/>
+              <a:ext cx="3332" cy="86350"/>
+            </a:xfrm>
+            <a:prstGeom prst="line">
+              <a:avLst/>
+            </a:prstGeom>
+          </p:spPr>
+          <p:style>
+            <a:lnRef idx="1">
+              <a:schemeClr val="accent1"/>
+            </a:lnRef>
+            <a:fillRef idx="0">
+              <a:schemeClr val="accent1"/>
+            </a:fillRef>
+            <a:effectRef idx="0">
+              <a:schemeClr val="accent1"/>
+            </a:effectRef>
+            <a:fontRef idx="minor">
+              <a:schemeClr val="tx1"/>
+            </a:fontRef>
+          </p:style>
+        </p:cxnSp>
+        <p:cxnSp>
+          <p:nvCxnSpPr>
+            <p:cNvPr id="107" name="Straight Connector 106">
+              <a:extLst>
+                <a:ext uri="{FF2B5EF4-FFF2-40B4-BE49-F238E27FC236}">
+                  <a16:creationId xmlns:a16="http://schemas.microsoft.com/office/drawing/2014/main" id="{113D9A90-95CD-6E41-92DF-819A2CEEF31E}"/>
+                </a:ext>
+              </a:extLst>
+            </p:cNvPr>
+            <p:cNvCxnSpPr>
+              <a:cxnSpLocks/>
+            </p:cNvCxnSpPr>
+            <p:nvPr/>
+          </p:nvCxnSpPr>
+          <p:spPr>
+            <a:xfrm flipH="1" flipV="1">
+              <a:off x="250241" y="255753"/>
+              <a:ext cx="3332" cy="86350"/>
+            </a:xfrm>
+            <a:prstGeom prst="line">
+              <a:avLst/>
+            </a:prstGeom>
+          </p:spPr>
+          <p:style>
+            <a:lnRef idx="1">
+              <a:schemeClr val="accent1"/>
+            </a:lnRef>
+            <a:fillRef idx="0">
+              <a:schemeClr val="accent1"/>
+            </a:fillRef>
+            <a:effectRef idx="0">
+              <a:schemeClr val="accent1"/>
+            </a:effectRef>
+            <a:fontRef idx="minor">
+              <a:schemeClr val="tx1"/>
+            </a:fontRef>
+          </p:style>
+        </p:cxnSp>
+      </p:grpSp>
+      <p:grpSp>
+        <p:nvGrpSpPr>
+          <p:cNvPr id="108" name="Group 107">
+            <a:extLst>
+              <a:ext uri="{FF2B5EF4-FFF2-40B4-BE49-F238E27FC236}">
+                <a16:creationId xmlns:a16="http://schemas.microsoft.com/office/drawing/2014/main" id="{06F3B113-6A76-9142-8BCE-6045B084855A}"/>
+              </a:ext>
+            </a:extLst>
+          </p:cNvPr>
+          <p:cNvGrpSpPr/>
+          <p:nvPr/>
+        </p:nvGrpSpPr>
+        <p:grpSpPr>
+          <a:xfrm>
+            <a:off x="3165133" y="356264"/>
+            <a:ext cx="56056" cy="162129"/>
+            <a:chOff x="207264" y="250046"/>
+            <a:chExt cx="56056" cy="162129"/>
+          </a:xfrm>
+        </p:grpSpPr>
+        <p:sp>
+          <p:nvSpPr>
+            <p:cNvPr id="109" name="Oval 108">
+              <a:extLst>
+                <a:ext uri="{FF2B5EF4-FFF2-40B4-BE49-F238E27FC236}">
+                  <a16:creationId xmlns:a16="http://schemas.microsoft.com/office/drawing/2014/main" id="{B88ED6E3-5E72-794C-AB89-B2A580399593}"/>
+                </a:ext>
+              </a:extLst>
+            </p:cNvPr>
+            <p:cNvSpPr/>
+            <p:nvPr/>
+          </p:nvSpPr>
+          <p:spPr>
+            <a:xfrm>
+              <a:off x="207264" y="356119"/>
+              <a:ext cx="56056" cy="56056"/>
+            </a:xfrm>
+            <a:prstGeom prst="ellipse">
+              <a:avLst/>
+            </a:prstGeom>
+            <a:solidFill>
+              <a:srgbClr val="EB6235"/>
+            </a:solidFill>
+            <a:ln>
+              <a:noFill/>
+            </a:ln>
+          </p:spPr>
+          <p:style>
+            <a:lnRef idx="2">
+              <a:schemeClr val="accent1">
+                <a:shade val="50000"/>
+              </a:schemeClr>
+            </a:lnRef>
+            <a:fillRef idx="1">
+              <a:schemeClr val="accent1"/>
+            </a:fillRef>
+            <a:effectRef idx="0">
+              <a:schemeClr val="accent1"/>
+            </a:effectRef>
+            <a:fontRef idx="minor">
+              <a:schemeClr val="lt1"/>
+            </a:fontRef>
+          </p:style>
+          <p:txBody>
+            <a:bodyPr rtlCol="0" anchor="ctr"/>
+            <a:lstStyle/>
+            <a:p>
+              <a:pPr algn="ctr"/>
+              <a:endParaRPr lang="en-US"/>
+            </a:p>
+          </p:txBody>
+        </p:sp>
+        <p:cxnSp>
+          <p:nvCxnSpPr>
+            <p:cNvPr id="110" name="Straight Connector 109">
+              <a:extLst>
+                <a:ext uri="{FF2B5EF4-FFF2-40B4-BE49-F238E27FC236}">
+                  <a16:creationId xmlns:a16="http://schemas.microsoft.com/office/drawing/2014/main" id="{D384A755-A5F1-CE46-B35E-C5ED65F9F040}"/>
+                </a:ext>
+              </a:extLst>
+            </p:cNvPr>
+            <p:cNvCxnSpPr>
+              <a:cxnSpLocks/>
+            </p:cNvCxnSpPr>
+            <p:nvPr/>
+          </p:nvCxnSpPr>
+          <p:spPr>
+            <a:xfrm flipH="1" flipV="1">
+              <a:off x="212141" y="255753"/>
+              <a:ext cx="3332" cy="86350"/>
+            </a:xfrm>
+            <a:prstGeom prst="line">
+              <a:avLst/>
+            </a:prstGeom>
+          </p:spPr>
+          <p:style>
+            <a:lnRef idx="1">
+              <a:schemeClr val="accent1"/>
+            </a:lnRef>
+            <a:fillRef idx="0">
+              <a:schemeClr val="accent1"/>
+            </a:fillRef>
+            <a:effectRef idx="0">
+              <a:schemeClr val="accent1"/>
+            </a:effectRef>
+            <a:fontRef idx="minor">
+              <a:schemeClr val="tx1"/>
+            </a:fontRef>
+          </p:style>
+        </p:cxnSp>
+        <p:cxnSp>
+          <p:nvCxnSpPr>
+            <p:cNvPr id="111" name="Straight Connector 110">
+              <a:extLst>
+                <a:ext uri="{FF2B5EF4-FFF2-40B4-BE49-F238E27FC236}">
+                  <a16:creationId xmlns:a16="http://schemas.microsoft.com/office/drawing/2014/main" id="{8F9E6A3D-99E4-5B47-8E2A-B06C4CF74141}"/>
+                </a:ext>
+              </a:extLst>
+            </p:cNvPr>
+            <p:cNvCxnSpPr/>
+            <p:nvPr/>
+          </p:nvCxnSpPr>
+          <p:spPr>
+            <a:xfrm flipH="1" flipV="1">
+              <a:off x="231960" y="250046"/>
+              <a:ext cx="3332" cy="86350"/>
+            </a:xfrm>
+            <a:prstGeom prst="line">
+              <a:avLst/>
+            </a:prstGeom>
+          </p:spPr>
+          <p:style>
+            <a:lnRef idx="1">
+              <a:schemeClr val="accent1"/>
+            </a:lnRef>
+            <a:fillRef idx="0">
+              <a:schemeClr val="accent1"/>
+            </a:fillRef>
+            <a:effectRef idx="0">
+              <a:schemeClr val="accent1"/>
+            </a:effectRef>
+            <a:fontRef idx="minor">
+              <a:schemeClr val="tx1"/>
+            </a:fontRef>
+          </p:style>
+        </p:cxnSp>
+        <p:cxnSp>
+          <p:nvCxnSpPr>
+            <p:cNvPr id="112" name="Straight Connector 111">
+              <a:extLst>
+                <a:ext uri="{FF2B5EF4-FFF2-40B4-BE49-F238E27FC236}">
+                  <a16:creationId xmlns:a16="http://schemas.microsoft.com/office/drawing/2014/main" id="{DB59E739-155C-2444-B14B-1BDF834FCC19}"/>
+                </a:ext>
+              </a:extLst>
+            </p:cNvPr>
+            <p:cNvCxnSpPr>
+              <a:cxnSpLocks/>
+            </p:cNvCxnSpPr>
+            <p:nvPr/>
+          </p:nvCxnSpPr>
+          <p:spPr>
+            <a:xfrm flipH="1" flipV="1">
+              <a:off x="250241" y="255753"/>
+              <a:ext cx="3332" cy="86350"/>
+            </a:xfrm>
+            <a:prstGeom prst="line">
+              <a:avLst/>
+            </a:prstGeom>
+          </p:spPr>
+          <p:style>
+            <a:lnRef idx="1">
+              <a:schemeClr val="accent1"/>
+            </a:lnRef>
+            <a:fillRef idx="0">
+              <a:schemeClr val="accent1"/>
+            </a:fillRef>
+            <a:effectRef idx="0">
+              <a:schemeClr val="accent1"/>
+            </a:effectRef>
+            <a:fontRef idx="minor">
+              <a:schemeClr val="tx1"/>
+            </a:fontRef>
+          </p:style>
+        </p:cxnSp>
+      </p:grpSp>
+      <p:grpSp>
+        <p:nvGrpSpPr>
+          <p:cNvPr id="113" name="Group 112">
+            <a:extLst>
+              <a:ext uri="{FF2B5EF4-FFF2-40B4-BE49-F238E27FC236}">
+                <a16:creationId xmlns:a16="http://schemas.microsoft.com/office/drawing/2014/main" id="{897D58FB-71A9-B342-A5E2-4B058A80FD12}"/>
+              </a:ext>
+            </a:extLst>
+          </p:cNvPr>
+          <p:cNvGrpSpPr/>
+          <p:nvPr/>
+        </p:nvGrpSpPr>
+        <p:grpSpPr>
+          <a:xfrm>
+            <a:off x="3033992" y="414440"/>
+            <a:ext cx="56056" cy="162129"/>
+            <a:chOff x="207264" y="250046"/>
+            <a:chExt cx="56056" cy="162129"/>
+          </a:xfrm>
+        </p:grpSpPr>
+        <p:sp>
+          <p:nvSpPr>
+            <p:cNvPr id="114" name="Oval 113">
+              <a:extLst>
+                <a:ext uri="{FF2B5EF4-FFF2-40B4-BE49-F238E27FC236}">
+                  <a16:creationId xmlns:a16="http://schemas.microsoft.com/office/drawing/2014/main" id="{F500B712-C375-234A-8DA6-112E80B0F3A3}"/>
+                </a:ext>
+              </a:extLst>
+            </p:cNvPr>
+            <p:cNvSpPr/>
+            <p:nvPr/>
+          </p:nvSpPr>
+          <p:spPr>
+            <a:xfrm>
+              <a:off x="207264" y="356119"/>
+              <a:ext cx="56056" cy="56056"/>
+            </a:xfrm>
+            <a:prstGeom prst="ellipse">
+              <a:avLst/>
+            </a:prstGeom>
+            <a:solidFill>
+              <a:srgbClr val="EB6235"/>
+            </a:solidFill>
+            <a:ln>
+              <a:noFill/>
+            </a:ln>
+          </p:spPr>
+          <p:style>
+            <a:lnRef idx="2">
+              <a:schemeClr val="accent1">
+                <a:shade val="50000"/>
+              </a:schemeClr>
+            </a:lnRef>
+            <a:fillRef idx="1">
+              <a:schemeClr val="accent1"/>
+            </a:fillRef>
+            <a:effectRef idx="0">
+              <a:schemeClr val="accent1"/>
+            </a:effectRef>
+            <a:fontRef idx="minor">
+              <a:schemeClr val="lt1"/>
+            </a:fontRef>
+          </p:style>
+          <p:txBody>
+            <a:bodyPr rtlCol="0" anchor="ctr"/>
+            <a:lstStyle/>
+            <a:p>
+              <a:pPr algn="ctr"/>
+              <a:endParaRPr lang="en-US"/>
+            </a:p>
+          </p:txBody>
+        </p:sp>
+        <p:cxnSp>
+          <p:nvCxnSpPr>
+            <p:cNvPr id="115" name="Straight Connector 114">
+              <a:extLst>
+                <a:ext uri="{FF2B5EF4-FFF2-40B4-BE49-F238E27FC236}">
+                  <a16:creationId xmlns:a16="http://schemas.microsoft.com/office/drawing/2014/main" id="{68EB9429-7889-CA49-A56D-3F8CE90077E0}"/>
+                </a:ext>
+              </a:extLst>
+            </p:cNvPr>
+            <p:cNvCxnSpPr>
+              <a:cxnSpLocks/>
+            </p:cNvCxnSpPr>
+            <p:nvPr/>
+          </p:nvCxnSpPr>
+          <p:spPr>
+            <a:xfrm flipH="1" flipV="1">
+              <a:off x="212141" y="255753"/>
+              <a:ext cx="3332" cy="86350"/>
+            </a:xfrm>
+            <a:prstGeom prst="line">
+              <a:avLst/>
+            </a:prstGeom>
+          </p:spPr>
+          <p:style>
+            <a:lnRef idx="1">
+              <a:schemeClr val="accent1"/>
+            </a:lnRef>
+            <a:fillRef idx="0">
+              <a:schemeClr val="accent1"/>
+            </a:fillRef>
+            <a:effectRef idx="0">
+              <a:schemeClr val="accent1"/>
+            </a:effectRef>
+            <a:fontRef idx="minor">
+              <a:schemeClr val="tx1"/>
+            </a:fontRef>
+          </p:style>
+        </p:cxnSp>
+        <p:cxnSp>
+          <p:nvCxnSpPr>
+            <p:cNvPr id="116" name="Straight Connector 115">
+              <a:extLst>
+                <a:ext uri="{FF2B5EF4-FFF2-40B4-BE49-F238E27FC236}">
+                  <a16:creationId xmlns:a16="http://schemas.microsoft.com/office/drawing/2014/main" id="{467D1AB6-1911-E943-8EF6-FAE7AC313A5A}"/>
+                </a:ext>
+              </a:extLst>
+            </p:cNvPr>
+            <p:cNvCxnSpPr/>
+            <p:nvPr/>
+          </p:nvCxnSpPr>
+          <p:spPr>
+            <a:xfrm flipH="1" flipV="1">
+              <a:off x="231960" y="250046"/>
+              <a:ext cx="3332" cy="86350"/>
+            </a:xfrm>
+            <a:prstGeom prst="line">
+              <a:avLst/>
+            </a:prstGeom>
+          </p:spPr>
+          <p:style>
+            <a:lnRef idx="1">
+              <a:schemeClr val="accent1"/>
+            </a:lnRef>
+            <a:fillRef idx="0">
+              <a:schemeClr val="accent1"/>
+            </a:fillRef>
+            <a:effectRef idx="0">
+              <a:schemeClr val="accent1"/>
+            </a:effectRef>
+            <a:fontRef idx="minor">
+              <a:schemeClr val="tx1"/>
+            </a:fontRef>
+          </p:style>
+        </p:cxnSp>
+        <p:cxnSp>
+          <p:nvCxnSpPr>
+            <p:cNvPr id="117" name="Straight Connector 116">
+              <a:extLst>
+                <a:ext uri="{FF2B5EF4-FFF2-40B4-BE49-F238E27FC236}">
+                  <a16:creationId xmlns:a16="http://schemas.microsoft.com/office/drawing/2014/main" id="{145434EB-62F8-5F45-8B4F-AE0ACC38A76F}"/>
+                </a:ext>
+              </a:extLst>
+            </p:cNvPr>
+            <p:cNvCxnSpPr>
+              <a:cxnSpLocks/>
+            </p:cNvCxnSpPr>
+            <p:nvPr/>
+          </p:nvCxnSpPr>
+          <p:spPr>
+            <a:xfrm flipH="1" flipV="1">
+              <a:off x="250241" y="255753"/>
+              <a:ext cx="3332" cy="86350"/>
+            </a:xfrm>
+            <a:prstGeom prst="line">
+              <a:avLst/>
+            </a:prstGeom>
+          </p:spPr>
+          <p:style>
+            <a:lnRef idx="1">
+              <a:schemeClr val="accent1"/>
+            </a:lnRef>
+            <a:fillRef idx="0">
+              <a:schemeClr val="accent1"/>
+            </a:fillRef>
+            <a:effectRef idx="0">
+              <a:schemeClr val="accent1"/>
+            </a:effectRef>
+            <a:fontRef idx="minor">
+              <a:schemeClr val="tx1"/>
+            </a:fontRef>
+          </p:style>
+        </p:cxnSp>
+      </p:grpSp>
+      <p:grpSp>
+        <p:nvGrpSpPr>
+          <p:cNvPr id="118" name="Group 117">
+            <a:extLst>
+              <a:ext uri="{FF2B5EF4-FFF2-40B4-BE49-F238E27FC236}">
+                <a16:creationId xmlns:a16="http://schemas.microsoft.com/office/drawing/2014/main" id="{7DCB791A-76A8-3547-930C-6C0DDD060743}"/>
+              </a:ext>
+            </a:extLst>
+          </p:cNvPr>
+          <p:cNvGrpSpPr/>
+          <p:nvPr/>
+        </p:nvGrpSpPr>
+        <p:grpSpPr>
+          <a:xfrm>
+            <a:off x="2827809" y="585554"/>
+            <a:ext cx="56056" cy="162129"/>
+            <a:chOff x="207264" y="250046"/>
+            <a:chExt cx="56056" cy="162129"/>
+          </a:xfrm>
+        </p:grpSpPr>
+        <p:sp>
+          <p:nvSpPr>
+            <p:cNvPr id="119" name="Oval 118">
+              <a:extLst>
+                <a:ext uri="{FF2B5EF4-FFF2-40B4-BE49-F238E27FC236}">
+                  <a16:creationId xmlns:a16="http://schemas.microsoft.com/office/drawing/2014/main" id="{41067CC1-7685-D14E-A6A8-ADF0D235B1DA}"/>
+                </a:ext>
+              </a:extLst>
+            </p:cNvPr>
+            <p:cNvSpPr/>
+            <p:nvPr/>
+          </p:nvSpPr>
+          <p:spPr>
+            <a:xfrm>
+              <a:off x="207264" y="356119"/>
+              <a:ext cx="56056" cy="56056"/>
+            </a:xfrm>
+            <a:prstGeom prst="ellipse">
+              <a:avLst/>
+            </a:prstGeom>
+            <a:solidFill>
+              <a:srgbClr val="EB6235"/>
+            </a:solidFill>
+            <a:ln>
+              <a:noFill/>
+            </a:ln>
+          </p:spPr>
+          <p:style>
+            <a:lnRef idx="2">
+              <a:schemeClr val="accent1">
+                <a:shade val="50000"/>
+              </a:schemeClr>
+            </a:lnRef>
+            <a:fillRef idx="1">
+              <a:schemeClr val="accent1"/>
+            </a:fillRef>
+            <a:effectRef idx="0">
+              <a:schemeClr val="accent1"/>
+            </a:effectRef>
+            <a:fontRef idx="minor">
+              <a:schemeClr val="lt1"/>
+            </a:fontRef>
+          </p:style>
+          <p:txBody>
+            <a:bodyPr rtlCol="0" anchor="ctr"/>
+            <a:lstStyle/>
+            <a:p>
+              <a:pPr algn="ctr"/>
+              <a:endParaRPr lang="en-US"/>
+            </a:p>
+          </p:txBody>
+        </p:sp>
+        <p:cxnSp>
+          <p:nvCxnSpPr>
+            <p:cNvPr id="120" name="Straight Connector 119">
+              <a:extLst>
+                <a:ext uri="{FF2B5EF4-FFF2-40B4-BE49-F238E27FC236}">
+                  <a16:creationId xmlns:a16="http://schemas.microsoft.com/office/drawing/2014/main" id="{5A08B6C0-CD56-4C4F-A786-D01F9C5BE815}"/>
+                </a:ext>
+              </a:extLst>
+            </p:cNvPr>
+            <p:cNvCxnSpPr>
+              <a:cxnSpLocks/>
+            </p:cNvCxnSpPr>
+            <p:nvPr/>
+          </p:nvCxnSpPr>
+          <p:spPr>
+            <a:xfrm flipH="1" flipV="1">
+              <a:off x="212141" y="255753"/>
+              <a:ext cx="3332" cy="86350"/>
+            </a:xfrm>
+            <a:prstGeom prst="line">
+              <a:avLst/>
+            </a:prstGeom>
+          </p:spPr>
+          <p:style>
+            <a:lnRef idx="1">
+              <a:schemeClr val="accent1"/>
+            </a:lnRef>
+            <a:fillRef idx="0">
+              <a:schemeClr val="accent1"/>
+            </a:fillRef>
+            <a:effectRef idx="0">
+              <a:schemeClr val="accent1"/>
+            </a:effectRef>
+            <a:fontRef idx="minor">
+              <a:schemeClr val="tx1"/>
+            </a:fontRef>
+          </p:style>
+        </p:cxnSp>
+        <p:cxnSp>
+          <p:nvCxnSpPr>
+            <p:cNvPr id="121" name="Straight Connector 120">
+              <a:extLst>
+                <a:ext uri="{FF2B5EF4-FFF2-40B4-BE49-F238E27FC236}">
+                  <a16:creationId xmlns:a16="http://schemas.microsoft.com/office/drawing/2014/main" id="{7DC18354-CE53-B848-9CB1-A9CA78378ED6}"/>
+                </a:ext>
+              </a:extLst>
+            </p:cNvPr>
+            <p:cNvCxnSpPr/>
+            <p:nvPr/>
+          </p:nvCxnSpPr>
+          <p:spPr>
+            <a:xfrm flipH="1" flipV="1">
+              <a:off x="231960" y="250046"/>
+              <a:ext cx="3332" cy="86350"/>
+            </a:xfrm>
+            <a:prstGeom prst="line">
+              <a:avLst/>
+            </a:prstGeom>
+          </p:spPr>
+          <p:style>
+            <a:lnRef idx="1">
+              <a:schemeClr val="accent1"/>
+            </a:lnRef>
+            <a:fillRef idx="0">
+              <a:schemeClr val="accent1"/>
+            </a:fillRef>
+            <a:effectRef idx="0">
+              <a:schemeClr val="accent1"/>
+            </a:effectRef>
+            <a:fontRef idx="minor">
+              <a:schemeClr val="tx1"/>
+            </a:fontRef>
+          </p:style>
+        </p:cxnSp>
+        <p:cxnSp>
+          <p:nvCxnSpPr>
+            <p:cNvPr id="122" name="Straight Connector 121">
+              <a:extLst>
+                <a:ext uri="{FF2B5EF4-FFF2-40B4-BE49-F238E27FC236}">
+                  <a16:creationId xmlns:a16="http://schemas.microsoft.com/office/drawing/2014/main" id="{46246094-B57F-BB47-BC56-81B91B4876E3}"/>
+                </a:ext>
+              </a:extLst>
+            </p:cNvPr>
+            <p:cNvCxnSpPr>
+              <a:cxnSpLocks/>
+            </p:cNvCxnSpPr>
+            <p:nvPr/>
+          </p:nvCxnSpPr>
+          <p:spPr>
+            <a:xfrm flipH="1" flipV="1">
+              <a:off x="250241" y="255753"/>
+              <a:ext cx="3332" cy="86350"/>
+            </a:xfrm>
+            <a:prstGeom prst="line">
+              <a:avLst/>
+            </a:prstGeom>
+          </p:spPr>
+          <p:style>
+            <a:lnRef idx="1">
+              <a:schemeClr val="accent1"/>
+            </a:lnRef>
+            <a:fillRef idx="0">
+              <a:schemeClr val="accent1"/>
+            </a:fillRef>
+            <a:effectRef idx="0">
+              <a:schemeClr val="accent1"/>
+            </a:effectRef>
+            <a:fontRef idx="minor">
+              <a:schemeClr val="tx1"/>
+            </a:fontRef>
+          </p:style>
+        </p:cxnSp>
+      </p:grpSp>
+      <p:grpSp>
+        <p:nvGrpSpPr>
+          <p:cNvPr id="123" name="Group 122">
+            <a:extLst>
+              <a:ext uri="{FF2B5EF4-FFF2-40B4-BE49-F238E27FC236}">
+                <a16:creationId xmlns:a16="http://schemas.microsoft.com/office/drawing/2014/main" id="{A19C8504-2C13-EB40-BA2F-66AC4A9242E4}"/>
+              </a:ext>
+            </a:extLst>
+          </p:cNvPr>
+          <p:cNvGrpSpPr/>
+          <p:nvPr/>
+        </p:nvGrpSpPr>
+        <p:grpSpPr>
+          <a:xfrm>
+            <a:off x="3286234" y="234946"/>
+            <a:ext cx="56056" cy="162129"/>
+            <a:chOff x="207264" y="250046"/>
+            <a:chExt cx="56056" cy="162129"/>
+          </a:xfrm>
+        </p:grpSpPr>
+        <p:sp>
+          <p:nvSpPr>
+            <p:cNvPr id="124" name="Oval 123">
+              <a:extLst>
+                <a:ext uri="{FF2B5EF4-FFF2-40B4-BE49-F238E27FC236}">
+                  <a16:creationId xmlns:a16="http://schemas.microsoft.com/office/drawing/2014/main" id="{2C23356B-C5E7-4B40-A960-AFA21D384D34}"/>
+                </a:ext>
+              </a:extLst>
+            </p:cNvPr>
+            <p:cNvSpPr/>
+            <p:nvPr/>
+          </p:nvSpPr>
+          <p:spPr>
+            <a:xfrm>
+              <a:off x="207264" y="356119"/>
+              <a:ext cx="56056" cy="56056"/>
+            </a:xfrm>
+            <a:prstGeom prst="ellipse">
+              <a:avLst/>
+            </a:prstGeom>
+            <a:solidFill>
+              <a:srgbClr val="EB6235"/>
+            </a:solidFill>
+            <a:ln>
+              <a:noFill/>
+            </a:ln>
+          </p:spPr>
+          <p:style>
+            <a:lnRef idx="2">
+              <a:schemeClr val="accent1">
+                <a:shade val="50000"/>
+              </a:schemeClr>
+            </a:lnRef>
+            <a:fillRef idx="1">
+              <a:schemeClr val="accent1"/>
+            </a:fillRef>
+            <a:effectRef idx="0">
+              <a:schemeClr val="accent1"/>
+            </a:effectRef>
+            <a:fontRef idx="minor">
+              <a:schemeClr val="lt1"/>
+            </a:fontRef>
+          </p:style>
+          <p:txBody>
+            <a:bodyPr rtlCol="0" anchor="ctr"/>
+            <a:lstStyle/>
+            <a:p>
+              <a:pPr algn="ctr"/>
+              <a:endParaRPr lang="en-US"/>
+            </a:p>
+          </p:txBody>
+        </p:sp>
+        <p:cxnSp>
+          <p:nvCxnSpPr>
+            <p:cNvPr id="125" name="Straight Connector 124">
+              <a:extLst>
+                <a:ext uri="{FF2B5EF4-FFF2-40B4-BE49-F238E27FC236}">
+                  <a16:creationId xmlns:a16="http://schemas.microsoft.com/office/drawing/2014/main" id="{1CA3A15A-7D94-F34D-85B7-EA89FF7D9152}"/>
+                </a:ext>
+              </a:extLst>
+            </p:cNvPr>
+            <p:cNvCxnSpPr>
+              <a:cxnSpLocks/>
+            </p:cNvCxnSpPr>
+            <p:nvPr/>
+          </p:nvCxnSpPr>
+          <p:spPr>
+            <a:xfrm flipH="1" flipV="1">
+              <a:off x="212141" y="255753"/>
+              <a:ext cx="3332" cy="86350"/>
+            </a:xfrm>
+            <a:prstGeom prst="line">
+              <a:avLst/>
+            </a:prstGeom>
+          </p:spPr>
+          <p:style>
+            <a:lnRef idx="1">
+              <a:schemeClr val="accent1"/>
+            </a:lnRef>
+            <a:fillRef idx="0">
+              <a:schemeClr val="accent1"/>
+            </a:fillRef>
+            <a:effectRef idx="0">
+              <a:schemeClr val="accent1"/>
+            </a:effectRef>
+            <a:fontRef idx="minor">
+              <a:schemeClr val="tx1"/>
+            </a:fontRef>
+          </p:style>
+        </p:cxnSp>
+        <p:cxnSp>
+          <p:nvCxnSpPr>
+            <p:cNvPr id="126" name="Straight Connector 125">
+              <a:extLst>
+                <a:ext uri="{FF2B5EF4-FFF2-40B4-BE49-F238E27FC236}">
+                  <a16:creationId xmlns:a16="http://schemas.microsoft.com/office/drawing/2014/main" id="{C00CDA39-3D0F-2B43-BA5A-F6901C7BC09C}"/>
+                </a:ext>
+              </a:extLst>
+            </p:cNvPr>
+            <p:cNvCxnSpPr/>
+            <p:nvPr/>
+          </p:nvCxnSpPr>
+          <p:spPr>
+            <a:xfrm flipH="1" flipV="1">
+              <a:off x="231960" y="250046"/>
+              <a:ext cx="3332" cy="86350"/>
+            </a:xfrm>
+            <a:prstGeom prst="line">
+              <a:avLst/>
+            </a:prstGeom>
+          </p:spPr>
+          <p:style>
+            <a:lnRef idx="1">
+              <a:schemeClr val="accent1"/>
+            </a:lnRef>
+            <a:fillRef idx="0">
+              <a:schemeClr val="accent1"/>
+            </a:fillRef>
+            <a:effectRef idx="0">
+              <a:schemeClr val="accent1"/>
+            </a:effectRef>
+            <a:fontRef idx="minor">
+              <a:schemeClr val="tx1"/>
+            </a:fontRef>
+          </p:style>
+        </p:cxnSp>
+        <p:cxnSp>
+          <p:nvCxnSpPr>
+            <p:cNvPr id="127" name="Straight Connector 126">
+              <a:extLst>
+                <a:ext uri="{FF2B5EF4-FFF2-40B4-BE49-F238E27FC236}">
+                  <a16:creationId xmlns:a16="http://schemas.microsoft.com/office/drawing/2014/main" id="{155538C8-9A25-AB48-B8AD-0E323284FDD1}"/>
+                </a:ext>
+              </a:extLst>
+            </p:cNvPr>
+            <p:cNvCxnSpPr>
+              <a:cxnSpLocks/>
+            </p:cNvCxnSpPr>
+            <p:nvPr/>
+          </p:nvCxnSpPr>
+          <p:spPr>
+            <a:xfrm flipH="1" flipV="1">
+              <a:off x="250241" y="255753"/>
+              <a:ext cx="3332" cy="86350"/>
+            </a:xfrm>
+            <a:prstGeom prst="line">
+              <a:avLst/>
+            </a:prstGeom>
+          </p:spPr>
+          <p:style>
+            <a:lnRef idx="1">
+              <a:schemeClr val="accent1"/>
+            </a:lnRef>
+            <a:fillRef idx="0">
+              <a:schemeClr val="accent1"/>
+            </a:fillRef>
+            <a:effectRef idx="0">
+              <a:schemeClr val="accent1"/>
+            </a:effectRef>
+            <a:fontRef idx="minor">
+              <a:schemeClr val="tx1"/>
+            </a:fontRef>
+          </p:style>
+        </p:cxnSp>
+      </p:grpSp>
+      <p:cxnSp>
+        <p:nvCxnSpPr>
+          <p:cNvPr id="128" name="Straight Connector 127">
+            <a:extLst>
+              <a:ext uri="{FF2B5EF4-FFF2-40B4-BE49-F238E27FC236}">
+                <a16:creationId xmlns:a16="http://schemas.microsoft.com/office/drawing/2014/main" id="{03A9BA20-C4F7-6D45-AEF4-50C7CD74C194}"/>
+              </a:ext>
+            </a:extLst>
+          </p:cNvPr>
+          <p:cNvCxnSpPr>
+            <a:cxnSpLocks/>
+          </p:cNvCxnSpPr>
+          <p:nvPr/>
+        </p:nvCxnSpPr>
+        <p:spPr>
+          <a:xfrm flipV="1">
+            <a:off x="1231075" y="1555782"/>
+            <a:ext cx="184732" cy="170390"/>
+          </a:xfrm>
+          <a:prstGeom prst="line">
+            <a:avLst/>
+          </a:prstGeom>
+          <a:ln w="31750"/>
+        </p:spPr>
+        <p:style>
+          <a:lnRef idx="1">
+            <a:schemeClr val="dk1"/>
+          </a:lnRef>
+          <a:fillRef idx="0">
+            <a:schemeClr val="dk1"/>
+          </a:fillRef>
+          <a:effectRef idx="0">
+            <a:schemeClr val="dk1"/>
+          </a:effectRef>
+          <a:fontRef idx="minor">
+            <a:schemeClr val="tx1"/>
+          </a:fontRef>
+        </p:style>
+      </p:cxnSp>
+      <p:cxnSp>
+        <p:nvCxnSpPr>
+          <p:cNvPr id="131" name="Straight Connector 130">
+            <a:extLst>
+              <a:ext uri="{FF2B5EF4-FFF2-40B4-BE49-F238E27FC236}">
+                <a16:creationId xmlns:a16="http://schemas.microsoft.com/office/drawing/2014/main" id="{7F8D36AA-728A-1847-BD05-82D37DA0E820}"/>
+              </a:ext>
+            </a:extLst>
+          </p:cNvPr>
+          <p:cNvCxnSpPr>
+            <a:cxnSpLocks/>
+          </p:cNvCxnSpPr>
+          <p:nvPr/>
+        </p:nvCxnSpPr>
+        <p:spPr>
+          <a:xfrm flipH="1" flipV="1">
+            <a:off x="1228749" y="1726171"/>
+            <a:ext cx="275882" cy="1"/>
+          </a:xfrm>
+          <a:prstGeom prst="line">
+            <a:avLst/>
+          </a:prstGeom>
+          <a:ln w="31750"/>
+        </p:spPr>
+        <p:style>
+          <a:lnRef idx="1">
+            <a:schemeClr val="dk1"/>
+          </a:lnRef>
+          <a:fillRef idx="0">
+            <a:schemeClr val="dk1"/>
+          </a:fillRef>
+          <a:effectRef idx="0">
+            <a:schemeClr val="dk1"/>
+          </a:effectRef>
+          <a:fontRef idx="minor">
+            <a:schemeClr val="tx1"/>
+          </a:fontRef>
+        </p:style>
+      </p:cxnSp>
+      <p:sp>
+        <p:nvSpPr>
+          <p:cNvPr id="132" name="Arc 131">
+            <a:extLst>
+              <a:ext uri="{FF2B5EF4-FFF2-40B4-BE49-F238E27FC236}">
+                <a16:creationId xmlns:a16="http://schemas.microsoft.com/office/drawing/2014/main" id="{35780505-0427-BF4C-A90B-DFAEF855B5B5}"/>
+              </a:ext>
+            </a:extLst>
+          </p:cNvPr>
+          <p:cNvSpPr/>
+          <p:nvPr/>
+        </p:nvSpPr>
+        <p:spPr>
+          <a:xfrm rot="19556421">
+            <a:off x="1106479" y="1542622"/>
+            <a:ext cx="307510" cy="300915"/>
+          </a:xfrm>
+          <a:prstGeom prst="arc">
+            <a:avLst>
+              <a:gd name="adj1" fmla="val 21162737"/>
+              <a:gd name="adj2" fmla="val 3093099"/>
+            </a:avLst>
+          </a:prstGeom>
+          <a:ln w="25400"/>
+        </p:spPr>
+        <p:style>
+          <a:lnRef idx="1">
+            <a:schemeClr val="dk1"/>
+          </a:lnRef>
+          <a:fillRef idx="0">
+            <a:schemeClr val="dk1"/>
+          </a:fillRef>
+          <a:effectRef idx="0">
+            <a:schemeClr val="dk1"/>
+          </a:effectRef>
+          <a:fontRef idx="minor">
+            <a:schemeClr val="tx1"/>
+          </a:fontRef>
+        </p:style>
+        <p:txBody>
+          <a:bodyPr rtlCol="0" anchor="ctr"/>
+          <a:lstStyle/>
+          <a:p>
+            <a:pPr algn="ctr"/>
+            <a:endParaRPr lang="en-US"/>
+          </a:p>
+        </p:txBody>
+      </p:sp>
+      <p:sp>
+        <p:nvSpPr>
+          <p:cNvPr id="133" name="TextBox 132">
+            <a:extLst>
+              <a:ext uri="{FF2B5EF4-FFF2-40B4-BE49-F238E27FC236}">
+                <a16:creationId xmlns:a16="http://schemas.microsoft.com/office/drawing/2014/main" id="{9CF993C6-1878-7F4D-A067-6342A6710F1E}"/>
+              </a:ext>
+            </a:extLst>
+          </p:cNvPr>
+          <p:cNvSpPr txBox="1"/>
+          <p:nvPr/>
+        </p:nvSpPr>
+        <p:spPr>
+          <a:xfrm>
+            <a:off x="1335901" y="1477381"/>
+            <a:ext cx="220005" cy="246221"/>
+          </a:xfrm>
+          <a:prstGeom prst="rect">
+            <a:avLst/>
+          </a:prstGeom>
+          <a:noFill/>
+        </p:spPr>
+        <p:txBody>
+          <a:bodyPr wrap="square" rtlCol="0">
+            <a:spAutoFit/>
+          </a:bodyPr>
+          <a:lstStyle/>
+          <a:p>
+            <a:r>
+              <a:rPr lang="en-US" sz="1000" i="1" dirty="0"/>
+              <a:t>⍺</a:t>
+            </a:r>
+          </a:p>
+        </p:txBody>
+      </p:sp>
+      <p:cxnSp>
+        <p:nvCxnSpPr>
+          <p:cNvPr id="134" name="Straight Connector 133">
+            <a:extLst>
+              <a:ext uri="{FF2B5EF4-FFF2-40B4-BE49-F238E27FC236}">
+                <a16:creationId xmlns:a16="http://schemas.microsoft.com/office/drawing/2014/main" id="{3158A649-C601-3743-B5C9-701349D7D568}"/>
+              </a:ext>
+            </a:extLst>
+          </p:cNvPr>
+          <p:cNvCxnSpPr>
+            <a:cxnSpLocks/>
+          </p:cNvCxnSpPr>
+          <p:nvPr/>
+        </p:nvCxnSpPr>
+        <p:spPr>
+          <a:xfrm flipV="1">
+            <a:off x="18519" y="1587335"/>
+            <a:ext cx="175297" cy="108888"/>
+          </a:xfrm>
+          <a:prstGeom prst="line">
+            <a:avLst/>
+          </a:prstGeom>
+          <a:ln w="31750"/>
+        </p:spPr>
+        <p:style>
+          <a:lnRef idx="1">
+            <a:schemeClr val="dk1"/>
+          </a:lnRef>
+          <a:fillRef idx="0">
+            <a:schemeClr val="dk1"/>
+          </a:fillRef>
+          <a:effectRef idx="0">
+            <a:schemeClr val="dk1"/>
+          </a:effectRef>
+          <a:fontRef idx="minor">
+            <a:schemeClr val="tx1"/>
+          </a:fontRef>
+        </p:style>
+      </p:cxnSp>
+      <p:cxnSp>
+        <p:nvCxnSpPr>
+          <p:cNvPr id="137" name="Straight Connector 136">
+            <a:extLst>
+              <a:ext uri="{FF2B5EF4-FFF2-40B4-BE49-F238E27FC236}">
+                <a16:creationId xmlns:a16="http://schemas.microsoft.com/office/drawing/2014/main" id="{A832C20A-A4A4-234F-8486-95571DFEF3B9}"/>
+              </a:ext>
+            </a:extLst>
+          </p:cNvPr>
+          <p:cNvCxnSpPr>
+            <a:cxnSpLocks/>
+          </p:cNvCxnSpPr>
+          <p:nvPr/>
+        </p:nvCxnSpPr>
+        <p:spPr>
+          <a:xfrm flipH="1" flipV="1">
+            <a:off x="26878" y="1693078"/>
+            <a:ext cx="203074" cy="1"/>
+          </a:xfrm>
+          <a:prstGeom prst="line">
+            <a:avLst/>
+          </a:prstGeom>
+          <a:ln w="31750"/>
+        </p:spPr>
+        <p:style>
+          <a:lnRef idx="1">
+            <a:schemeClr val="dk1"/>
+          </a:lnRef>
+          <a:fillRef idx="0">
+            <a:schemeClr val="dk1"/>
+          </a:fillRef>
+          <a:effectRef idx="0">
+            <a:schemeClr val="dk1"/>
+          </a:effectRef>
+          <a:fontRef idx="minor">
+            <a:schemeClr val="tx1"/>
+          </a:fontRef>
+        </p:style>
+      </p:cxnSp>
+      <p:sp>
+        <p:nvSpPr>
+          <p:cNvPr id="139" name="Arc 138">
+            <a:extLst>
+              <a:ext uri="{FF2B5EF4-FFF2-40B4-BE49-F238E27FC236}">
+                <a16:creationId xmlns:a16="http://schemas.microsoft.com/office/drawing/2014/main" id="{26A9A38D-7388-D34E-A0FA-CB5FCBF7A0DD}"/>
+              </a:ext>
+            </a:extLst>
+          </p:cNvPr>
+          <p:cNvSpPr/>
+          <p:nvPr/>
+        </p:nvSpPr>
+        <p:spPr>
+          <a:xfrm rot="19556421">
+            <a:off x="-129456" y="1587273"/>
+            <a:ext cx="307510" cy="300915"/>
+          </a:xfrm>
+          <a:prstGeom prst="arc">
+            <a:avLst>
+              <a:gd name="adj1" fmla="val 20931620"/>
+              <a:gd name="adj2" fmla="val 1016581"/>
+            </a:avLst>
+          </a:prstGeom>
+          <a:ln w="25400"/>
+        </p:spPr>
+        <p:style>
+          <a:lnRef idx="1">
+            <a:schemeClr val="dk1"/>
+          </a:lnRef>
+          <a:fillRef idx="0">
+            <a:schemeClr val="dk1"/>
+          </a:fillRef>
+          <a:effectRef idx="0">
+            <a:schemeClr val="dk1"/>
+          </a:effectRef>
+          <a:fontRef idx="minor">
+            <a:schemeClr val="tx1"/>
+          </a:fontRef>
+        </p:style>
+        <p:txBody>
+          <a:bodyPr rtlCol="0" anchor="ctr"/>
+          <a:lstStyle/>
+          <a:p>
+            <a:pPr algn="ctr"/>
+            <a:endParaRPr lang="en-US"/>
+          </a:p>
+        </p:txBody>
+      </p:sp>
+      <p:sp>
+        <p:nvSpPr>
+          <p:cNvPr id="140" name="TextBox 139">
+            <a:extLst>
+              <a:ext uri="{FF2B5EF4-FFF2-40B4-BE49-F238E27FC236}">
+                <a16:creationId xmlns:a16="http://schemas.microsoft.com/office/drawing/2014/main" id="{C9BCCB49-3E58-284C-AE71-1D34E2CAE3D7}"/>
+              </a:ext>
+            </a:extLst>
+          </p:cNvPr>
+          <p:cNvSpPr txBox="1"/>
+          <p:nvPr/>
+        </p:nvSpPr>
+        <p:spPr>
+          <a:xfrm>
+            <a:off x="94439" y="1502123"/>
+            <a:ext cx="220005" cy="246221"/>
+          </a:xfrm>
+          <a:prstGeom prst="rect">
+            <a:avLst/>
+          </a:prstGeom>
+          <a:noFill/>
+        </p:spPr>
+        <p:txBody>
+          <a:bodyPr wrap="square" rtlCol="0">
+            <a:spAutoFit/>
+          </a:bodyPr>
+          <a:lstStyle/>
+          <a:p>
+            <a:r>
+              <a:rPr lang="en-US" sz="1000" i="1" dirty="0"/>
+              <a:t>⍺</a:t>
+            </a:r>
+          </a:p>
+        </p:txBody>
+      </p:sp>
+      <p:cxnSp>
+        <p:nvCxnSpPr>
+          <p:cNvPr id="143" name="Straight Connector 142">
+            <a:extLst>
+              <a:ext uri="{FF2B5EF4-FFF2-40B4-BE49-F238E27FC236}">
+                <a16:creationId xmlns:a16="http://schemas.microsoft.com/office/drawing/2014/main" id="{488C5567-AE6A-B14B-9F31-441DA6D390AE}"/>
+              </a:ext>
+            </a:extLst>
+          </p:cNvPr>
+          <p:cNvCxnSpPr>
+            <a:cxnSpLocks/>
+          </p:cNvCxnSpPr>
+          <p:nvPr/>
+        </p:nvCxnSpPr>
+        <p:spPr>
+          <a:xfrm flipV="1">
+            <a:off x="2996668" y="1526971"/>
+            <a:ext cx="266222" cy="2335"/>
+          </a:xfrm>
+          <a:prstGeom prst="line">
+            <a:avLst/>
+          </a:prstGeom>
+          <a:ln w="31750"/>
+        </p:spPr>
+        <p:style>
+          <a:lnRef idx="1">
+            <a:schemeClr val="dk1"/>
+          </a:lnRef>
+          <a:fillRef idx="0">
+            <a:schemeClr val="dk1"/>
+          </a:fillRef>
+          <a:effectRef idx="0">
+            <a:schemeClr val="dk1"/>
+          </a:effectRef>
+          <a:fontRef idx="minor">
+            <a:schemeClr val="tx1"/>
+          </a:fontRef>
+        </p:style>
+      </p:cxnSp>
+      <mc:AlternateContent xmlns:mc="http://schemas.openxmlformats.org/markup-compatibility/2006">
+        <mc:Choice xmlns:a14="http://schemas.microsoft.com/office/drawing/2010/main" Requires="a14">
+          <p:sp>
+            <p:nvSpPr>
+              <p:cNvPr id="146" name="TextBox 145">
+                <a:extLst>
+                  <a:ext uri="{FF2B5EF4-FFF2-40B4-BE49-F238E27FC236}">
+                    <a16:creationId xmlns:a16="http://schemas.microsoft.com/office/drawing/2014/main" id="{3BBC7C62-DC69-FC4F-AFFF-A44148A0A3DF}"/>
+                  </a:ext>
+                </a:extLst>
+              </p:cNvPr>
+              <p:cNvSpPr txBox="1"/>
+              <p:nvPr/>
+            </p:nvSpPr>
+            <p:spPr>
+              <a:xfrm>
+                <a:off x="3237800" y="1302064"/>
+                <a:ext cx="220005" cy="246221"/>
+              </a:xfrm>
+              <a:prstGeom prst="rect">
+                <a:avLst/>
+              </a:prstGeom>
+              <a:noFill/>
+            </p:spPr>
+            <p:txBody>
+              <a:bodyPr wrap="square" rtlCol="0">
+                <a:spAutoFit/>
+              </a:bodyPr>
+              <a:lstStyle/>
+              <a:p>
+                <a:pPr/>
+                <a14:m>
+                  <m:oMathPara xmlns:m="http://schemas.openxmlformats.org/officeDocument/2006/math">
+                    <m:oMathParaPr>
+                      <m:jc m:val="centerGroup"/>
+                    </m:oMathParaPr>
+                    <m:oMath xmlns:m="http://schemas.openxmlformats.org/officeDocument/2006/math">
+                      <m:r>
+                        <a:rPr lang="en-US" sz="1000" i="1" dirty="0" smtClean="0">
+                          <a:latin typeface="Cambria Math" panose="02040503050406030204" pitchFamily="18" charset="0"/>
+                          <a:ea typeface="Cambria Math" panose="02040503050406030204" pitchFamily="18" charset="0"/>
+                        </a:rPr>
+                        <m:t>𝜃</m:t>
+                      </m:r>
+                    </m:oMath>
+                  </m:oMathPara>
+                </a14:m>
+                <a:endParaRPr lang="en-US" sz="1000" i="1" dirty="0"/>
+              </a:p>
+            </p:txBody>
+          </p:sp>
+        </mc:Choice>
+        <mc:Fallback>
+          <p:sp>
+            <p:nvSpPr>
+              <p:cNvPr id="146" name="TextBox 145">
+                <a:extLst>
+                  <a:ext uri="{FF2B5EF4-FFF2-40B4-BE49-F238E27FC236}">
+                    <a16:creationId xmlns:a16="http://schemas.microsoft.com/office/drawing/2014/main" id="{3BBC7C62-DC69-FC4F-AFFF-A44148A0A3DF}"/>
+                  </a:ext>
+                </a:extLst>
+              </p:cNvPr>
+              <p:cNvSpPr txBox="1">
+                <a:spLocks noRot="1" noChangeAspect="1" noMove="1" noResize="1" noEditPoints="1" noAdjustHandles="1" noChangeArrowheads="1" noChangeShapeType="1" noTextEdit="1"/>
+              </p:cNvSpPr>
+              <p:nvPr/>
+            </p:nvSpPr>
+            <p:spPr>
+              <a:xfrm>
+                <a:off x="3237800" y="1302064"/>
+                <a:ext cx="220005" cy="246221"/>
+              </a:xfrm>
+              <a:prstGeom prst="rect">
+                <a:avLst/>
+              </a:prstGeom>
+              <a:blipFill>
+                <a:blip r:embed="rId3"/>
+                <a:stretch>
+                  <a:fillRect/>
+                </a:stretch>
+              </a:blipFill>
+            </p:spPr>
+            <p:txBody>
+              <a:bodyPr/>
+              <a:lstStyle/>
+              <a:p>
+                <a:r>
+                  <a:rPr lang="en-US">
+                    <a:noFill/>
+                  </a:rPr>
+                  <a:t> </a:t>
+                </a:r>
+              </a:p>
+            </p:txBody>
+          </p:sp>
+        </mc:Fallback>
+      </mc:AlternateContent>
+      <p:sp>
+        <p:nvSpPr>
+          <p:cNvPr id="149" name="Arc 148">
+            <a:extLst>
+              <a:ext uri="{FF2B5EF4-FFF2-40B4-BE49-F238E27FC236}">
+                <a16:creationId xmlns:a16="http://schemas.microsoft.com/office/drawing/2014/main" id="{7F44A080-CDB0-C147-8B31-804BFFC459BB}"/>
+              </a:ext>
+            </a:extLst>
+          </p:cNvPr>
+          <p:cNvSpPr/>
+          <p:nvPr/>
+        </p:nvSpPr>
+        <p:spPr>
+          <a:xfrm rot="19556421">
+            <a:off x="2906497" y="1372323"/>
+            <a:ext cx="307510" cy="300915"/>
+          </a:xfrm>
+          <a:prstGeom prst="arc">
+            <a:avLst>
+              <a:gd name="adj1" fmla="val 111089"/>
+              <a:gd name="adj2" fmla="val 1954288"/>
+            </a:avLst>
+          </a:prstGeom>
+          <a:ln w="25400"/>
+        </p:spPr>
+        <p:style>
+          <a:lnRef idx="1">
+            <a:schemeClr val="dk1"/>
+          </a:lnRef>
+          <a:fillRef idx="0">
+            <a:schemeClr val="dk1"/>
+          </a:fillRef>
+          <a:effectRef idx="0">
+            <a:schemeClr val="dk1"/>
+          </a:effectRef>
+          <a:fontRef idx="minor">
+            <a:schemeClr val="tx1"/>
+          </a:fontRef>
+        </p:style>
+        <p:txBody>
+          <a:bodyPr rtlCol="0" anchor="ctr"/>
+          <a:lstStyle/>
+          <a:p>
+            <a:pPr algn="ctr"/>
+            <a:endParaRPr lang="en-US"/>
+          </a:p>
+        </p:txBody>
+      </p:sp>
+      <p:sp>
+        <p:nvSpPr>
+          <p:cNvPr id="150" name="Oval 149">
+            <a:extLst>
+              <a:ext uri="{FF2B5EF4-FFF2-40B4-BE49-F238E27FC236}">
+                <a16:creationId xmlns:a16="http://schemas.microsoft.com/office/drawing/2014/main" id="{1BEBAD60-9F53-6447-AB59-F80C63EEB0FA}"/>
+              </a:ext>
+            </a:extLst>
+          </p:cNvPr>
+          <p:cNvSpPr/>
+          <p:nvPr/>
+        </p:nvSpPr>
+        <p:spPr>
+          <a:xfrm>
+            <a:off x="550844" y="1528006"/>
+            <a:ext cx="45719" cy="45719"/>
+          </a:xfrm>
+          <a:prstGeom prst="ellipse">
+            <a:avLst/>
+          </a:prstGeom>
+          <a:solidFill>
+            <a:schemeClr val="tx1"/>
+          </a:solidFill>
+          <a:ln>
+            <a:noFill/>
+          </a:ln>
+        </p:spPr>
+        <p:style>
+          <a:lnRef idx="2">
+            <a:schemeClr val="accent1">
+              <a:shade val="50000"/>
+            </a:schemeClr>
+          </a:lnRef>
+          <a:fillRef idx="1">
+            <a:schemeClr val="accent1"/>
+          </a:fillRef>
+          <a:effectRef idx="0">
+            <a:schemeClr val="accent1"/>
+          </a:effectRef>
+          <a:fontRef idx="minor">
+            <a:schemeClr val="lt1"/>
+          </a:fontRef>
+        </p:style>
+        <p:txBody>
+          <a:bodyPr rtlCol="0" anchor="ctr"/>
+          <a:lstStyle/>
+          <a:p>
+            <a:pPr algn="ctr"/>
+            <a:endParaRPr lang="en-US"/>
+          </a:p>
+        </p:txBody>
+      </p:sp>
+      <p:sp>
+        <p:nvSpPr>
+          <p:cNvPr id="152" name="TextBox 151">
+            <a:extLst>
+              <a:ext uri="{FF2B5EF4-FFF2-40B4-BE49-F238E27FC236}">
+                <a16:creationId xmlns:a16="http://schemas.microsoft.com/office/drawing/2014/main" id="{46F07A54-83B8-CC47-A385-2639D296488E}"/>
+              </a:ext>
+            </a:extLst>
+          </p:cNvPr>
+          <p:cNvSpPr txBox="1"/>
+          <p:nvPr/>
+        </p:nvSpPr>
+        <p:spPr>
+          <a:xfrm>
+            <a:off x="295710" y="1552256"/>
+            <a:ext cx="1167849" cy="184666"/>
+          </a:xfrm>
+          <a:prstGeom prst="rect">
+            <a:avLst/>
+          </a:prstGeom>
+          <a:noFill/>
+        </p:spPr>
+        <p:txBody>
+          <a:bodyPr wrap="square" rtlCol="0">
+            <a:spAutoFit/>
+          </a:bodyPr>
+          <a:lstStyle/>
+          <a:p>
+            <a:r>
+              <a:rPr lang="en-US" sz="600" dirty="0">
+                <a:latin typeface="Times" pitchFamily="2" charset="0"/>
+              </a:rPr>
+              <a:t>Object COM</a:t>
+            </a:r>
+          </a:p>
+        </p:txBody>
+      </p:sp>
+      <p:sp>
+        <p:nvSpPr>
+          <p:cNvPr id="153" name="TextBox 152">
+            <a:extLst>
+              <a:ext uri="{FF2B5EF4-FFF2-40B4-BE49-F238E27FC236}">
+                <a16:creationId xmlns:a16="http://schemas.microsoft.com/office/drawing/2014/main" id="{34297FF3-5520-3C4F-943B-27FC536F1973}"/>
+              </a:ext>
+            </a:extLst>
+          </p:cNvPr>
+          <p:cNvSpPr txBox="1"/>
+          <p:nvPr/>
+        </p:nvSpPr>
+        <p:spPr>
+          <a:xfrm>
+            <a:off x="1192705" y="878241"/>
+            <a:ext cx="640557" cy="184666"/>
+          </a:xfrm>
+          <a:prstGeom prst="rect">
+            <a:avLst/>
+          </a:prstGeom>
+          <a:solidFill>
+            <a:schemeClr val="bg1"/>
+          </a:solidFill>
+        </p:spPr>
+        <p:txBody>
+          <a:bodyPr wrap="square" rtlCol="0">
+            <a:spAutoFit/>
+          </a:bodyPr>
+          <a:lstStyle/>
+          <a:p>
+            <a:pPr algn="ctr"/>
+            <a:r>
+              <a:rPr lang="en-US" sz="600" dirty="0">
+                <a:latin typeface="Times" pitchFamily="2" charset="0"/>
+              </a:rPr>
+              <a:t>Particles COM</a:t>
+            </a:r>
+          </a:p>
+        </p:txBody>
+      </p:sp>
+      <p:cxnSp>
+        <p:nvCxnSpPr>
+          <p:cNvPr id="15" name="Straight Arrow Connector 14">
+            <a:extLst>
+              <a:ext uri="{FF2B5EF4-FFF2-40B4-BE49-F238E27FC236}">
+                <a16:creationId xmlns:a16="http://schemas.microsoft.com/office/drawing/2014/main" id="{184D2100-489F-AC4F-B3E4-AB19D558697F}"/>
+              </a:ext>
+            </a:extLst>
+          </p:cNvPr>
+          <p:cNvCxnSpPr>
+            <a:cxnSpLocks/>
+          </p:cNvCxnSpPr>
+          <p:nvPr/>
+        </p:nvCxnSpPr>
+        <p:spPr>
+          <a:xfrm>
+            <a:off x="1618073" y="1049731"/>
+            <a:ext cx="207153" cy="211974"/>
+          </a:xfrm>
+          <a:prstGeom prst="straightConnector1">
+            <a:avLst/>
+          </a:prstGeom>
+          <a:ln>
+            <a:headEnd type="none"/>
+            <a:tailEnd type="stealth"/>
+          </a:ln>
+        </p:spPr>
+        <p:style>
+          <a:lnRef idx="1">
+            <a:schemeClr val="dk1"/>
+          </a:lnRef>
+          <a:fillRef idx="0">
+            <a:schemeClr val="dk1"/>
+          </a:fillRef>
+          <a:effectRef idx="0">
+            <a:schemeClr val="dk1"/>
+          </a:effectRef>
+          <a:fontRef idx="minor">
+            <a:schemeClr val="tx1"/>
+          </a:fontRef>
+        </p:style>
+      </p:cxnSp>
+      <p:sp>
+        <p:nvSpPr>
+          <p:cNvPr id="135" name="TextBox 134">
+            <a:extLst>
+              <a:ext uri="{FF2B5EF4-FFF2-40B4-BE49-F238E27FC236}">
+                <a16:creationId xmlns:a16="http://schemas.microsoft.com/office/drawing/2014/main" id="{1C71811F-F8EF-C54A-B749-A34C4569D727}"/>
+              </a:ext>
+            </a:extLst>
+          </p:cNvPr>
+          <p:cNvSpPr txBox="1"/>
+          <p:nvPr/>
+        </p:nvSpPr>
+        <p:spPr>
+          <a:xfrm>
+            <a:off x="3150289" y="1025539"/>
+            <a:ext cx="165695" cy="246221"/>
+          </a:xfrm>
+          <a:prstGeom prst="rect">
+            <a:avLst/>
+          </a:prstGeom>
+          <a:solidFill>
+            <a:srgbClr val="EB6235"/>
+          </a:solidFill>
+        </p:spPr>
+        <p:txBody>
+          <a:bodyPr wrap="square" rtlCol="0">
+            <a:spAutoFit/>
+          </a:bodyPr>
+          <a:lstStyle/>
+          <a:p>
+            <a:r>
+              <a:rPr lang="en-US" sz="1000" i="1" dirty="0"/>
+              <a:t>⍺</a:t>
+            </a:r>
+          </a:p>
+        </p:txBody>
+      </p:sp>
+      <p:sp>
+        <p:nvSpPr>
+          <p:cNvPr id="136" name="TextBox 135">
+            <a:extLst>
+              <a:ext uri="{FF2B5EF4-FFF2-40B4-BE49-F238E27FC236}">
+                <a16:creationId xmlns:a16="http://schemas.microsoft.com/office/drawing/2014/main" id="{2B240D6D-5424-124B-841D-32532470444C}"/>
+              </a:ext>
+            </a:extLst>
+          </p:cNvPr>
+          <p:cNvSpPr txBox="1"/>
+          <p:nvPr/>
+        </p:nvSpPr>
+        <p:spPr>
+          <a:xfrm rot="19994382">
+            <a:off x="2680006" y="1373175"/>
+            <a:ext cx="187703" cy="246221"/>
+          </a:xfrm>
+          <a:prstGeom prst="rect">
+            <a:avLst/>
+          </a:prstGeom>
+          <a:solidFill>
+            <a:srgbClr val="EB6235"/>
+          </a:solidFill>
+        </p:spPr>
+        <p:txBody>
+          <a:bodyPr wrap="square" rtlCol="0">
+            <a:spAutoFit/>
+          </a:bodyPr>
+          <a:lstStyle/>
+          <a:p>
+            <a:endParaRPr lang="en-US" sz="1000" i="1" dirty="0"/>
+          </a:p>
+        </p:txBody>
+      </p:sp>
+      <p:sp>
+        <p:nvSpPr>
+          <p:cNvPr id="24" name="Rectangle 23">
+            <a:extLst>
+              <a:ext uri="{FF2B5EF4-FFF2-40B4-BE49-F238E27FC236}">
+                <a16:creationId xmlns:a16="http://schemas.microsoft.com/office/drawing/2014/main" id="{96A0F1FE-70AE-064B-95C1-FF51DCA5B039}"/>
+              </a:ext>
+            </a:extLst>
+          </p:cNvPr>
+          <p:cNvSpPr/>
+          <p:nvPr/>
+        </p:nvSpPr>
+        <p:spPr>
+          <a:xfrm rot="20222179">
+            <a:off x="2732658" y="1584161"/>
+            <a:ext cx="257439" cy="90020"/>
+          </a:xfrm>
+          <a:prstGeom prst="rect">
+            <a:avLst/>
+          </a:prstGeom>
+          <a:solidFill>
+            <a:srgbClr val="FF8080"/>
+          </a:solidFill>
+          <a:ln>
+            <a:noFill/>
+          </a:ln>
+        </p:spPr>
+        <p:style>
+          <a:lnRef idx="2">
+            <a:schemeClr val="accent1">
+              <a:shade val="50000"/>
+            </a:schemeClr>
+          </a:lnRef>
+          <a:fillRef idx="1">
+            <a:schemeClr val="accent1"/>
+          </a:fillRef>
+          <a:effectRef idx="0">
+            <a:schemeClr val="accent1"/>
+          </a:effectRef>
+          <a:fontRef idx="minor">
+            <a:schemeClr val="lt1"/>
+          </a:fontRef>
+        </p:style>
+        <p:txBody>
+          <a:bodyPr rtlCol="0" anchor="ctr"/>
+          <a:lstStyle/>
+          <a:p>
+            <a:pPr algn="ctr"/>
+            <a:endParaRPr lang="en-US"/>
+          </a:p>
+        </p:txBody>
+      </p:sp>
+      <p:sp>
+        <p:nvSpPr>
+          <p:cNvPr id="138" name="TextBox 137">
+            <a:extLst>
+              <a:ext uri="{FF2B5EF4-FFF2-40B4-BE49-F238E27FC236}">
+                <a16:creationId xmlns:a16="http://schemas.microsoft.com/office/drawing/2014/main" id="{1AA24352-911C-064F-B3EF-B0A9E03BC4FC}"/>
+              </a:ext>
+            </a:extLst>
+          </p:cNvPr>
+          <p:cNvSpPr txBox="1"/>
+          <p:nvPr/>
+        </p:nvSpPr>
+        <p:spPr>
+          <a:xfrm>
+            <a:off x="2564973" y="1446857"/>
+            <a:ext cx="220005" cy="246221"/>
+          </a:xfrm>
+          <a:prstGeom prst="rect">
+            <a:avLst/>
+          </a:prstGeom>
+          <a:noFill/>
+        </p:spPr>
+        <p:txBody>
+          <a:bodyPr wrap="square" rtlCol="0">
+            <a:spAutoFit/>
+          </a:bodyPr>
+          <a:lstStyle/>
+          <a:p>
+            <a:r>
+              <a:rPr lang="en-US" sz="1000" i="1" dirty="0"/>
+              <a:t>⍺</a:t>
+            </a:r>
+          </a:p>
+        </p:txBody>
+      </p:sp>
     </p:spTree>
     <p:extLst>
       <p:ext uri="{BB962C8B-B14F-4D97-AF65-F5344CB8AC3E}">

</xml_diff>